<commit_message>
Edits to last slide were not included in last pushed version.
</commit_message>
<xml_diff>
--- a/Project_1_Final.pptx
+++ b/Project_1_Final.pptx
@@ -5,29 +5,30 @@
     <p:sldMasterId id="2147483732" r:id="rId1"/>
   </p:sldMasterIdLst>
   <p:notesMasterIdLst>
-    <p:notesMasterId r:id="rId22"/>
+    <p:notesMasterId r:id="rId23"/>
   </p:notesMasterIdLst>
   <p:sldIdLst>
     <p:sldId id="256" r:id="rId2"/>
     <p:sldId id="257" r:id="rId3"/>
     <p:sldId id="276" r:id="rId4"/>
-    <p:sldId id="259" r:id="rId5"/>
-    <p:sldId id="262" r:id="rId6"/>
-    <p:sldId id="263" r:id="rId7"/>
-    <p:sldId id="280" r:id="rId8"/>
-    <p:sldId id="277" r:id="rId9"/>
-    <p:sldId id="278" r:id="rId10"/>
-    <p:sldId id="271" r:id="rId11"/>
-    <p:sldId id="266" r:id="rId12"/>
-    <p:sldId id="265" r:id="rId13"/>
-    <p:sldId id="273" r:id="rId14"/>
-    <p:sldId id="275" r:id="rId15"/>
-    <p:sldId id="272" r:id="rId16"/>
-    <p:sldId id="279" r:id="rId17"/>
-    <p:sldId id="269" r:id="rId18"/>
-    <p:sldId id="274" r:id="rId19"/>
-    <p:sldId id="260" r:id="rId20"/>
-    <p:sldId id="267" r:id="rId21"/>
+    <p:sldId id="261" r:id="rId5"/>
+    <p:sldId id="259" r:id="rId6"/>
+    <p:sldId id="262" r:id="rId7"/>
+    <p:sldId id="263" r:id="rId8"/>
+    <p:sldId id="280" r:id="rId9"/>
+    <p:sldId id="277" r:id="rId10"/>
+    <p:sldId id="278" r:id="rId11"/>
+    <p:sldId id="271" r:id="rId12"/>
+    <p:sldId id="266" r:id="rId13"/>
+    <p:sldId id="265" r:id="rId14"/>
+    <p:sldId id="273" r:id="rId15"/>
+    <p:sldId id="275" r:id="rId16"/>
+    <p:sldId id="281" r:id="rId17"/>
+    <p:sldId id="279" r:id="rId18"/>
+    <p:sldId id="269" r:id="rId19"/>
+    <p:sldId id="274" r:id="rId20"/>
+    <p:sldId id="260" r:id="rId21"/>
+    <p:sldId id="267" r:id="rId22"/>
   </p:sldIdLst>
   <p:sldSz cx="12192000" cy="6858000"/>
   <p:notesSz cx="6858000" cy="9144000"/>
@@ -134,29 +135,16 @@
 </p:presentation>
 </file>
 
-<file path=ppt/revisionInfo.xml><?xml version="1.0" encoding="utf-8"?>
-<p1510:revInfo xmlns:a="http://schemas.openxmlformats.org/drawingml/2006/main" xmlns:r="http://schemas.openxmlformats.org/officeDocument/2006/relationships" xmlns:p1510="http://schemas.microsoft.com/office/powerpoint/2015/10/main">
-  <p1510:revLst>
-    <p1510:client id="{0B86C39F-909D-B000-B1EB-C7A9D988A251}" v="7115" dt="2021-05-01T05:56:49.332"/>
-    <p1510:client id="{0F0AC49F-00B1-C000-17CB-27CA2787119C}" v="34" dt="2021-05-02T19:05:55.720"/>
-    <p1510:client id="{10100A95-BA84-3FC7-B002-DC5AF2D58645}" v="454" dt="2021-05-01T00:43:34.034"/>
-    <p1510:client id="{1079C39F-80E8-C000-17D8-6EE583B3F88D}" v="578" dt="2021-05-01T01:01:07.751"/>
-    <p1510:client id="{1DB5F7CF-582A-6DB2-B0BA-C6AE0E8FE5B5}" v="573" dt="2021-05-01T03:55:01.648"/>
-    <p1510:client id="{1E7AC39F-505F-C000-17CB-2C750B4EF3FE}" v="690" dt="2021-05-01T02:11:03.784"/>
-    <p1510:client id="{256A423D-95D7-8BC6-F38A-82F940C7F909}" v="8" dt="2021-05-01T16:50:21.438"/>
-    <p1510:client id="{3FA5C39F-0000-B000-DCA4-6984C7AF18A6}" v="4" dt="2021-05-01T14:00:37.934"/>
-    <p1510:client id="{5174C39F-F0BB-B000-B1EB-CF75526896E5}" v="41" dt="2021-04-30T23:42:03.789"/>
-    <p1510:client id="{6F7AC39F-F00E-B000-DEF9-6A73EE18F58C}" v="5310" dt="2021-05-01T02:21:09.781"/>
-    <p1510:client id="{798AC39F-508D-B000-B1EB-CC4511BB5AF9}" v="15" dt="2021-05-01T06:06:55.033"/>
-    <p1510:client id="{867EC39F-B0B3-B000-B1EB-C0981865F414}" v="128" dt="2021-05-01T02:54:20.728"/>
-    <p1510:client id="{A778C39F-E07E-C000-17CB-291E67B50C9C}" v="22" dt="2021-05-01T00:41:27.993"/>
-    <p1510:client id="{D35EC39F-30E6-B000-DDC5-DEA88B193A06}" v="2267" dt="2021-04-30T18:55:23.897"/>
-    <p1510:client id="{ECADC39F-B0B1-B000-B1EB-C44DBD08DFCE}" v="16" dt="2021-05-01T16:16:08.907"/>
-    <p1510:client id="{F08EE678-045C-4EE2-B5DC-8F60B2C9E7C5}" v="2758" dt="2021-05-01T04:03:12.757"/>
-    <p1510:client id="{F381C39F-A04F-C000-17D8-68D52B721551}" v="2" dt="2021-05-01T03:22:38.096"/>
-    <p1510:client id="{F3A6C39F-2071-B000-DCA4-6485AF6002E1}" v="13" dt="2021-05-01T15:57:16.550"/>
-  </p1510:revLst>
-</p1510:revInfo>
+<file path=ppt/commentAuthors.xml><?xml version="1.0" encoding="utf-8"?>
+<p:cmAuthorLst xmlns:a="http://schemas.openxmlformats.org/drawingml/2006/main" xmlns:r="http://schemas.openxmlformats.org/officeDocument/2006/relationships" xmlns:p="http://schemas.openxmlformats.org/presentationml/2006/main">
+  <p:cmAuthor id="1" name="Corey D Anderson" initials="CDA" lastIdx="1" clrIdx="0">
+    <p:extLst>
+      <p:ext uri="{19B8F6BF-5375-455C-9EA6-DF929625EA0E}">
+        <p15:presenceInfo xmlns:p15="http://schemas.microsoft.com/office/powerpoint/2012/main" userId="Corey D Anderson" providerId="None"/>
+      </p:ext>
+    </p:extLst>
+  </p:cmAuthor>
+</p:cmAuthorLst>
 </file>
 
 <file path=ppt/notesMasters/notesMaster1.xml><?xml version="1.0" encoding="utf-8"?>
@@ -576,7 +564,7 @@
           <a:p>
             <a:fld id="{1B524498-B8AC-48D3-8A3E-6377147FCE9D}" type="slidenum">
               <a:rPr lang="en-US" smtClean="0"/>
-              <a:t>19</a:t>
+              <a:t>20</a:t>
             </a:fld>
             <a:endParaRPr lang="en-US"/>
           </a:p>
@@ -4662,6 +4650,97 @@
 <file path=ppt/slides/slide10.xml><?xml version="1.0" encoding="utf-8"?>
 <p:sld xmlns:a="http://schemas.openxmlformats.org/drawingml/2006/main" xmlns:r="http://schemas.openxmlformats.org/officeDocument/2006/relationships" xmlns:p="http://schemas.openxmlformats.org/presentationml/2006/main">
   <p:cSld>
+    <p:spTree>
+      <p:nvGrpSpPr>
+        <p:cNvPr id="1" name=""/>
+        <p:cNvGrpSpPr/>
+        <p:nvPr/>
+      </p:nvGrpSpPr>
+      <p:grpSpPr>
+        <a:xfrm>
+          <a:off x="0" y="0"/>
+          <a:ext cx="0" cy="0"/>
+          <a:chOff x="0" y="0"/>
+          <a:chExt cx="0" cy="0"/>
+        </a:xfrm>
+      </p:grpSpPr>
+      <p:sp>
+        <p:nvSpPr>
+          <p:cNvPr id="2" name="Title 1">
+            <a:extLst>
+              <a:ext uri="{FF2B5EF4-FFF2-40B4-BE49-F238E27FC236}">
+                <a16:creationId xmlns:a16="http://schemas.microsoft.com/office/drawing/2014/main" id="{A58A2383-D90F-418D-8ED9-33C005B2248F}"/>
+              </a:ext>
+            </a:extLst>
+          </p:cNvPr>
+          <p:cNvSpPr>
+            <a:spLocks noGrp="1"/>
+          </p:cNvSpPr>
+          <p:nvPr>
+            <p:ph type="title"/>
+          </p:nvPr>
+        </p:nvSpPr>
+        <p:spPr>
+          <a:xfrm>
+            <a:off x="1045029" y="2153876"/>
+            <a:ext cx="10241280" cy="1234440"/>
+          </a:xfrm>
+        </p:spPr>
+        <p:txBody>
+          <a:bodyPr>
+            <a:normAutofit/>
+          </a:bodyPr>
+          <a:lstStyle/>
+          <a:p>
+            <a:pPr algn="ctr"/>
+            <a:r>
+              <a:rPr lang="en-US" sz="6600"/>
+              <a:t>RESULTS</a:t>
+            </a:r>
+          </a:p>
+        </p:txBody>
+      </p:sp>
+      <p:sp>
+        <p:nvSpPr>
+          <p:cNvPr id="3" name="Content Placeholder 2">
+            <a:extLst>
+              <a:ext uri="{FF2B5EF4-FFF2-40B4-BE49-F238E27FC236}">
+                <a16:creationId xmlns:a16="http://schemas.microsoft.com/office/drawing/2014/main" id="{6AA7DEB6-6037-4947-832C-F98B38359A15}"/>
+              </a:ext>
+            </a:extLst>
+          </p:cNvPr>
+          <p:cNvSpPr>
+            <a:spLocks noGrp="1"/>
+          </p:cNvSpPr>
+          <p:nvPr>
+            <p:ph idx="1"/>
+          </p:nvPr>
+        </p:nvSpPr>
+        <p:spPr/>
+        <p:txBody>
+          <a:bodyPr/>
+          <a:lstStyle/>
+          <a:p>
+            <a:endParaRPr lang="en-US"/>
+          </a:p>
+        </p:txBody>
+      </p:sp>
+    </p:spTree>
+    <p:extLst>
+      <p:ext uri="{BB962C8B-B14F-4D97-AF65-F5344CB8AC3E}">
+        <p14:creationId xmlns:p14="http://schemas.microsoft.com/office/powerpoint/2010/main" val="109206503"/>
+      </p:ext>
+    </p:extLst>
+  </p:cSld>
+  <p:clrMapOvr>
+    <a:masterClrMapping/>
+  </p:clrMapOvr>
+</p:sld>
+</file>
+
+<file path=ppt/slides/slide11.xml><?xml version="1.0" encoding="utf-8"?>
+<p:sld xmlns:a="http://schemas.openxmlformats.org/drawingml/2006/main" xmlns:r="http://schemas.openxmlformats.org/officeDocument/2006/relationships" xmlns:p="http://schemas.openxmlformats.org/presentationml/2006/main">
+  <p:cSld>
     <p:bg>
       <p:bgPr>
         <a:solidFill>
@@ -5070,7 +5149,7 @@
 </p:sld>
 </file>
 
-<file path=ppt/slides/slide11.xml><?xml version="1.0" encoding="utf-8"?>
+<file path=ppt/slides/slide12.xml><?xml version="1.0" encoding="utf-8"?>
 <p:sld xmlns:a="http://schemas.openxmlformats.org/drawingml/2006/main" xmlns:r="http://schemas.openxmlformats.org/officeDocument/2006/relationships" xmlns:p="http://schemas.openxmlformats.org/presentationml/2006/main">
   <p:cSld>
     <p:spTree>
@@ -5485,7 +5564,7 @@
 </p:sld>
 </file>
 
-<file path=ppt/slides/slide12.xml><?xml version="1.0" encoding="utf-8"?>
+<file path=ppt/slides/slide13.xml><?xml version="1.0" encoding="utf-8"?>
 <p:sld xmlns:a="http://schemas.openxmlformats.org/drawingml/2006/main" xmlns:r="http://schemas.openxmlformats.org/officeDocument/2006/relationships" xmlns:p="http://schemas.openxmlformats.org/presentationml/2006/main">
   <p:cSld>
     <p:spTree>
@@ -5701,7 +5780,7 @@
 </p:sld>
 </file>
 
-<file path=ppt/slides/slide13.xml><?xml version="1.0" encoding="utf-8"?>
+<file path=ppt/slides/slide14.xml><?xml version="1.0" encoding="utf-8"?>
 <p:sld xmlns:a="http://schemas.openxmlformats.org/drawingml/2006/main" xmlns:r="http://schemas.openxmlformats.org/officeDocument/2006/relationships" xmlns:p="http://schemas.openxmlformats.org/presentationml/2006/main">
   <p:cSld>
     <p:spTree>
@@ -5833,7 +5912,7 @@
             <a:pPr algn="ctr"/>
             <a:r>
               <a:rPr lang="en-US" b="1"/>
-              <a:t>Hot-Spot Analysis: Automobile Accident Counts (top) and Rates per 10000 people (bottom)</a:t>
+              <a:t>Hot-Sport Analysis: Automobile Accident Counts (top) and Rates per 10000 people (bottom)</a:t>
             </a:r>
           </a:p>
         </p:txBody>
@@ -5851,7 +5930,7 @@
 </p:sld>
 </file>
 
-<file path=ppt/slides/slide14.xml><?xml version="1.0" encoding="utf-8"?>
+<file path=ppt/slides/slide15.xml><?xml version="1.0" encoding="utf-8"?>
 <p:sld xmlns:a="http://schemas.openxmlformats.org/drawingml/2006/main" xmlns:r="http://schemas.openxmlformats.org/officeDocument/2006/relationships" xmlns:p="http://schemas.openxmlformats.org/presentationml/2006/main">
   <p:cSld>
     <p:spTree>
@@ -6000,17 +6079,9 @@
 </p:sld>
 </file>
 
-<file path=ppt/slides/slide15.xml><?xml version="1.0" encoding="utf-8"?>
+<file path=ppt/slides/slide16.xml><?xml version="1.0" encoding="utf-8"?>
 <p:sld xmlns:a="http://schemas.openxmlformats.org/drawingml/2006/main" xmlns:r="http://schemas.openxmlformats.org/officeDocument/2006/relationships" xmlns:p="http://schemas.openxmlformats.org/presentationml/2006/main">
   <p:cSld>
-    <p:bg>
-      <p:bgPr>
-        <a:solidFill>
-          <a:schemeClr val="bg1"/>
-        </a:solidFill>
-        <a:effectLst/>
-      </p:bgPr>
-    </p:bg>
     <p:spTree>
       <p:nvGrpSpPr>
         <p:cNvPr id="1" name=""/>
@@ -6027,232 +6098,6 @@
       </p:grpSpPr>
       <p:sp>
         <p:nvSpPr>
-          <p:cNvPr id="32" name="Rectangle 31">
-            <a:extLst>
-              <a:ext uri="{FF2B5EF4-FFF2-40B4-BE49-F238E27FC236}">
-                <a16:creationId xmlns:a16="http://schemas.microsoft.com/office/drawing/2014/main" id="{BD4C0BBB-0042-4603-A226-6117F3FD5B3C}"/>
-              </a:ext>
-              <a:ext uri="{C183D7F6-B498-43B3-948B-1728B52AA6E4}">
-                <adec:decorative xmlns:adec="http://schemas.microsoft.com/office/drawing/2017/decorative" val="1"/>
-              </a:ext>
-            </a:extLst>
-          </p:cNvPr>
-          <p:cNvSpPr>
-            <a:spLocks noGrp="1" noRot="1" noChangeAspect="1" noMove="1" noResize="1" noEditPoints="1" noAdjustHandles="1" noChangeArrowheads="1" noChangeShapeType="1" noTextEdit="1"/>
-          </p:cNvSpPr>
-          <p:nvPr>
-            <p:extLst>
-              <p:ext uri="{386F3935-93C4-4BCD-93E2-E3B085C9AB24}">
-                <p16:designElem xmlns:p16="http://schemas.microsoft.com/office/powerpoint/2015/main" val="1"/>
-              </p:ext>
-            </p:extLst>
-          </p:nvPr>
-        </p:nvSpPr>
-        <p:spPr>
-          <a:xfrm rot="10800000" flipH="1">
-            <a:off x="0" y="6400799"/>
-            <a:ext cx="12192000" cy="456773"/>
-          </a:xfrm>
-          <a:prstGeom prst="rect">
-            <a:avLst/>
-          </a:prstGeom>
-          <a:gradFill>
-            <a:gsLst>
-              <a:gs pos="14000">
-                <a:schemeClr val="accent4">
-                  <a:alpha val="28000"/>
-                </a:schemeClr>
-              </a:gs>
-              <a:gs pos="100000">
-                <a:schemeClr val="accent5">
-                  <a:alpha val="85000"/>
-                </a:schemeClr>
-              </a:gs>
-            </a:gsLst>
-            <a:lin ang="6000000" scaled="0"/>
-          </a:gradFill>
-          <a:ln>
-            <a:noFill/>
-          </a:ln>
-        </p:spPr>
-        <p:style>
-          <a:lnRef idx="2">
-            <a:schemeClr val="accent1">
-              <a:shade val="50000"/>
-            </a:schemeClr>
-          </a:lnRef>
-          <a:fillRef idx="1">
-            <a:schemeClr val="accent1"/>
-          </a:fillRef>
-          <a:effectRef idx="0">
-            <a:schemeClr val="accent1"/>
-          </a:effectRef>
-          <a:fontRef idx="minor">
-            <a:schemeClr val="lt1"/>
-          </a:fontRef>
-        </p:style>
-        <p:txBody>
-          <a:bodyPr rtlCol="0" anchor="ctr"/>
-          <a:lstStyle/>
-          <a:p>
-            <a:pPr algn="ctr"/>
-            <a:endParaRPr lang="en-US"/>
-          </a:p>
-        </p:txBody>
-      </p:sp>
-      <p:sp>
-        <p:nvSpPr>
-          <p:cNvPr id="34" name="Rectangle 33">
-            <a:extLst>
-              <a:ext uri="{FF2B5EF4-FFF2-40B4-BE49-F238E27FC236}">
-                <a16:creationId xmlns:a16="http://schemas.microsoft.com/office/drawing/2014/main" id="{EC44F520-2598-460E-9F91-B02F60830CA2}"/>
-              </a:ext>
-              <a:ext uri="{C183D7F6-B498-43B3-948B-1728B52AA6E4}">
-                <adec:decorative xmlns:adec="http://schemas.microsoft.com/office/drawing/2017/decorative" val="1"/>
-              </a:ext>
-            </a:extLst>
-          </p:cNvPr>
-          <p:cNvSpPr>
-            <a:spLocks noGrp="1" noRot="1" noChangeAspect="1" noMove="1" noResize="1" noEditPoints="1" noAdjustHandles="1" noChangeArrowheads="1" noChangeShapeType="1" noTextEdit="1"/>
-          </p:cNvSpPr>
-          <p:nvPr>
-            <p:extLst>
-              <p:ext uri="{386F3935-93C4-4BCD-93E2-E3B085C9AB24}">
-                <p16:designElem xmlns:p16="http://schemas.microsoft.com/office/powerpoint/2015/main" val="1"/>
-              </p:ext>
-            </p:extLst>
-          </p:nvPr>
-        </p:nvSpPr>
-        <p:spPr>
-          <a:xfrm flipH="1">
-            <a:off x="4038600" y="6400799"/>
-            <a:ext cx="8153398" cy="456772"/>
-          </a:xfrm>
-          <a:prstGeom prst="rect">
-            <a:avLst/>
-          </a:prstGeom>
-          <a:gradFill>
-            <a:gsLst>
-              <a:gs pos="9000">
-                <a:schemeClr val="accent2">
-                  <a:lumMod val="60000"/>
-                  <a:lumOff val="40000"/>
-                  <a:alpha val="55000"/>
-                </a:schemeClr>
-              </a:gs>
-              <a:gs pos="99000">
-                <a:schemeClr val="accent2"/>
-              </a:gs>
-            </a:gsLst>
-            <a:lin ang="14400000" scaled="0"/>
-          </a:gradFill>
-          <a:ln>
-            <a:noFill/>
-          </a:ln>
-        </p:spPr>
-        <p:style>
-          <a:lnRef idx="2">
-            <a:schemeClr val="accent1">
-              <a:shade val="50000"/>
-            </a:schemeClr>
-          </a:lnRef>
-          <a:fillRef idx="1">
-            <a:schemeClr val="accent1"/>
-          </a:fillRef>
-          <a:effectRef idx="0">
-            <a:schemeClr val="accent1"/>
-          </a:effectRef>
-          <a:fontRef idx="minor">
-            <a:schemeClr val="lt1"/>
-          </a:fontRef>
-        </p:style>
-        <p:txBody>
-          <a:bodyPr rtlCol="0" anchor="ctr"/>
-          <a:lstStyle/>
-          <a:p>
-            <a:pPr algn="ctr"/>
-            <a:endParaRPr lang="en-US"/>
-          </a:p>
-        </p:txBody>
-      </p:sp>
-      <p:sp useBgFill="1">
-        <p:nvSpPr>
-          <p:cNvPr id="36" name="Rectangle 35">
-            <a:extLst>
-              <a:ext uri="{FF2B5EF4-FFF2-40B4-BE49-F238E27FC236}">
-                <a16:creationId xmlns:a16="http://schemas.microsoft.com/office/drawing/2014/main" id="{FBC072A9-737B-43EA-8F67-8155C25E607E}"/>
-              </a:ext>
-              <a:ext uri="{C183D7F6-B498-43B3-948B-1728B52AA6E4}">
-                <adec:decorative xmlns:adec="http://schemas.microsoft.com/office/drawing/2017/decorative" val="1"/>
-              </a:ext>
-            </a:extLst>
-          </p:cNvPr>
-          <p:cNvSpPr>
-            <a:spLocks noGrp="1" noRot="1" noChangeAspect="1" noMove="1" noResize="1" noEditPoints="1" noAdjustHandles="1" noChangeArrowheads="1" noChangeShapeType="1" noTextEdit="1"/>
-          </p:cNvSpPr>
-          <p:nvPr>
-            <p:extLst>
-              <p:ext uri="{386F3935-93C4-4BCD-93E2-E3B085C9AB24}">
-                <p16:designElem xmlns:p16="http://schemas.microsoft.com/office/powerpoint/2015/main" val="1"/>
-              </p:ext>
-            </p:extLst>
-          </p:nvPr>
-        </p:nvSpPr>
-        <p:spPr>
-          <a:xfrm>
-            <a:off x="0" y="0"/>
-            <a:ext cx="12192000" cy="6858000"/>
-          </a:xfrm>
-          <a:prstGeom prst="rect">
-            <a:avLst/>
-          </a:prstGeom>
-          <a:ln w="12700" cap="flat" cmpd="sng" algn="ctr">
-            <a:noFill/>
-            <a:prstDash val="solid"/>
-            <a:miter lim="800000"/>
-          </a:ln>
-          <a:effectLst/>
-          <a:extLst>
-            <a:ext uri="{91240B29-F687-4F45-9708-019B960494DF}">
-              <a14:hiddenLine xmlns:a14="http://schemas.microsoft.com/office/drawing/2010/main" w="12700" cap="flat" cmpd="sng" algn="ctr">
-                <a:solidFill>
-                  <a:schemeClr val="accent1">
-                    <a:shade val="50000"/>
-                  </a:schemeClr>
-                </a:solidFill>
-                <a:prstDash val="solid"/>
-                <a:miter lim="800000"/>
-              </a14:hiddenLine>
-            </a:ext>
-          </a:extLst>
-        </p:spPr>
-        <p:style>
-          <a:lnRef idx="2">
-            <a:schemeClr val="accent1">
-              <a:shade val="50000"/>
-            </a:schemeClr>
-          </a:lnRef>
-          <a:fillRef idx="1">
-            <a:schemeClr val="accent1"/>
-          </a:fillRef>
-          <a:effectRef idx="0">
-            <a:schemeClr val="accent1"/>
-          </a:effectRef>
-          <a:fontRef idx="minor">
-            <a:schemeClr val="lt1"/>
-          </a:fontRef>
-        </p:style>
-        <p:txBody>
-          <a:bodyPr rtlCol="0" anchor="ctr"/>
-          <a:lstStyle/>
-          <a:p>
-            <a:pPr algn="ctr"/>
-            <a:endParaRPr lang="en-US"/>
-          </a:p>
-        </p:txBody>
-      </p:sp>
-      <p:sp>
-        <p:nvSpPr>
           <p:cNvPr id="9" name="TextBox 8">
             <a:extLst>
               <a:ext uri="{FF2B5EF4-FFF2-40B4-BE49-F238E27FC236}">
@@ -6330,156 +6175,6 @@
           </a:prstGeom>
         </p:spPr>
       </p:pic>
-      <p:sp>
-        <p:nvSpPr>
-          <p:cNvPr id="38" name="Rectangle 37">
-            <a:extLst>
-              <a:ext uri="{FF2B5EF4-FFF2-40B4-BE49-F238E27FC236}">
-                <a16:creationId xmlns:a16="http://schemas.microsoft.com/office/drawing/2014/main" id="{0EB06CB7-868E-4636-A33A-E193292A6F50}"/>
-              </a:ext>
-              <a:ext uri="{C183D7F6-B498-43B3-948B-1728B52AA6E4}">
-                <adec:decorative xmlns:adec="http://schemas.microsoft.com/office/drawing/2017/decorative" val="1"/>
-              </a:ext>
-            </a:extLst>
-          </p:cNvPr>
-          <p:cNvSpPr>
-            <a:spLocks noGrp="1" noRot="1" noChangeAspect="1" noMove="1" noResize="1" noEditPoints="1" noAdjustHandles="1" noChangeArrowheads="1" noChangeShapeType="1" noTextEdit="1"/>
-          </p:cNvSpPr>
-          <p:nvPr>
-            <p:extLst>
-              <p:ext uri="{386F3935-93C4-4BCD-93E2-E3B085C9AB24}">
-                <p16:designElem xmlns:p16="http://schemas.microsoft.com/office/powerpoint/2015/main" val="1"/>
-              </p:ext>
-            </p:extLst>
-          </p:nvPr>
-        </p:nvSpPr>
-        <p:spPr>
-          <a:xfrm rot="10800000" flipH="1">
-            <a:off x="0" y="6408741"/>
-            <a:ext cx="12192000" cy="449256"/>
-          </a:xfrm>
-          <a:prstGeom prst="rect">
-            <a:avLst/>
-          </a:prstGeom>
-          <a:gradFill>
-            <a:gsLst>
-              <a:gs pos="14000">
-                <a:schemeClr val="accent4">
-                  <a:alpha val="28000"/>
-                </a:schemeClr>
-              </a:gs>
-              <a:gs pos="100000">
-                <a:schemeClr val="accent5">
-                  <a:alpha val="85000"/>
-                </a:schemeClr>
-              </a:gs>
-            </a:gsLst>
-            <a:lin ang="9000000" scaled="0"/>
-          </a:gradFill>
-          <a:ln>
-            <a:noFill/>
-          </a:ln>
-        </p:spPr>
-        <p:style>
-          <a:lnRef idx="2">
-            <a:schemeClr val="accent1">
-              <a:shade val="50000"/>
-            </a:schemeClr>
-          </a:lnRef>
-          <a:fillRef idx="1">
-            <a:schemeClr val="accent1"/>
-          </a:fillRef>
-          <a:effectRef idx="0">
-            <a:schemeClr val="accent1"/>
-          </a:effectRef>
-          <a:fontRef idx="minor">
-            <a:schemeClr val="lt1"/>
-          </a:fontRef>
-        </p:style>
-        <p:txBody>
-          <a:bodyPr rtlCol="0" anchor="ctr"/>
-          <a:lstStyle/>
-          <a:p>
-            <a:pPr algn="ctr"/>
-            <a:endParaRPr lang="en-US"/>
-          </a:p>
-        </p:txBody>
-      </p:sp>
-      <p:sp>
-        <p:nvSpPr>
-          <p:cNvPr id="40" name="Rectangle 39">
-            <a:extLst>
-              <a:ext uri="{FF2B5EF4-FFF2-40B4-BE49-F238E27FC236}">
-                <a16:creationId xmlns:a16="http://schemas.microsoft.com/office/drawing/2014/main" id="{AFD90F94-5ADB-4D14-BFA5-C0815CAE6D8D}"/>
-              </a:ext>
-              <a:ext uri="{C183D7F6-B498-43B3-948B-1728B52AA6E4}">
-                <adec:decorative xmlns:adec="http://schemas.microsoft.com/office/drawing/2017/decorative" val="1"/>
-              </a:ext>
-            </a:extLst>
-          </p:cNvPr>
-          <p:cNvSpPr>
-            <a:spLocks noGrp="1" noRot="1" noChangeAspect="1" noMove="1" noResize="1" noEditPoints="1" noAdjustHandles="1" noChangeArrowheads="1" noChangeShapeType="1" noTextEdit="1"/>
-          </p:cNvSpPr>
-          <p:nvPr>
-            <p:extLst>
-              <p:ext uri="{386F3935-93C4-4BCD-93E2-E3B085C9AB24}">
-                <p16:designElem xmlns:p16="http://schemas.microsoft.com/office/powerpoint/2015/main" val="1"/>
-              </p:ext>
-            </p:extLst>
-          </p:nvPr>
-        </p:nvSpPr>
-        <p:spPr>
-          <a:xfrm flipH="1">
-            <a:off x="4038600" y="6408316"/>
-            <a:ext cx="8153398" cy="449684"/>
-          </a:xfrm>
-          <a:prstGeom prst="rect">
-            <a:avLst/>
-          </a:prstGeom>
-          <a:gradFill>
-            <a:gsLst>
-              <a:gs pos="9000">
-                <a:schemeClr val="accent2">
-                  <a:lumMod val="60000"/>
-                  <a:lumOff val="40000"/>
-                  <a:alpha val="68000"/>
-                </a:schemeClr>
-              </a:gs>
-              <a:gs pos="99000">
-                <a:schemeClr val="accent2"/>
-              </a:gs>
-            </a:gsLst>
-            <a:lin ang="13800000" scaled="0"/>
-          </a:gradFill>
-          <a:ln>
-            <a:noFill/>
-          </a:ln>
-        </p:spPr>
-        <p:style>
-          <a:lnRef idx="2">
-            <a:schemeClr val="accent1">
-              <a:shade val="50000"/>
-            </a:schemeClr>
-          </a:lnRef>
-          <a:fillRef idx="1">
-            <a:schemeClr val="accent1"/>
-          </a:fillRef>
-          <a:effectRef idx="0">
-            <a:schemeClr val="accent1"/>
-          </a:effectRef>
-          <a:fontRef idx="minor">
-            <a:schemeClr val="lt1"/>
-          </a:fontRef>
-        </p:style>
-        <p:txBody>
-          <a:bodyPr rtlCol="0" anchor="ctr"/>
-          <a:lstStyle/>
-          <a:p>
-            <a:pPr algn="ctr"/>
-            <a:endParaRPr lang="en-US"/>
-          </a:p>
-        </p:txBody>
-      </p:sp>
       <p:pic>
         <p:nvPicPr>
           <p:cNvPr id="8" name="Picture 9" descr="Chart, scatter chart&#10;&#10;Description automatically generated">
@@ -6668,341 +6363,7 @@
     </p:spTree>
     <p:extLst>
       <p:ext uri="{BB962C8B-B14F-4D97-AF65-F5344CB8AC3E}">
-        <p14:creationId xmlns:p14="http://schemas.microsoft.com/office/powerpoint/2010/main" val="2602384345"/>
-      </p:ext>
-    </p:extLst>
-  </p:cSld>
-  <p:clrMapOvr>
-    <a:masterClrMapping/>
-  </p:clrMapOvr>
-</p:sld>
-</file>
-
-<file path=ppt/slides/slide16.xml><?xml version="1.0" encoding="utf-8"?>
-<p:sld xmlns:a="http://schemas.openxmlformats.org/drawingml/2006/main" xmlns:r="http://schemas.openxmlformats.org/officeDocument/2006/relationships" xmlns:p="http://schemas.openxmlformats.org/presentationml/2006/main">
-  <p:cSld>
-    <p:spTree>
-      <p:nvGrpSpPr>
-        <p:cNvPr id="1" name=""/>
-        <p:cNvGrpSpPr/>
-        <p:nvPr/>
-      </p:nvGrpSpPr>
-      <p:grpSpPr>
-        <a:xfrm>
-          <a:off x="0" y="0"/>
-          <a:ext cx="0" cy="0"/>
-          <a:chOff x="0" y="0"/>
-          <a:chExt cx="0" cy="0"/>
-        </a:xfrm>
-      </p:grpSpPr>
-      <p:sp>
-        <p:nvSpPr>
-          <p:cNvPr id="2" name="Title 1">
-            <a:extLst>
-              <a:ext uri="{FF2B5EF4-FFF2-40B4-BE49-F238E27FC236}">
-                <a16:creationId xmlns:a16="http://schemas.microsoft.com/office/drawing/2014/main" id="{A1A0F93A-6A2E-41B7-9266-77DE4638D5EA}"/>
-              </a:ext>
-            </a:extLst>
-          </p:cNvPr>
-          <p:cNvSpPr>
-            <a:spLocks noGrp="1"/>
-          </p:cNvSpPr>
-          <p:nvPr>
-            <p:ph type="title"/>
-          </p:nvPr>
-        </p:nvSpPr>
-        <p:spPr>
-          <a:xfrm>
-            <a:off x="472345" y="213377"/>
-            <a:ext cx="10241280" cy="642826"/>
-          </a:xfrm>
-        </p:spPr>
-        <p:txBody>
-          <a:bodyPr/>
-          <a:lstStyle/>
-          <a:p>
-            <a:r>
-              <a:rPr lang="en-US"/>
-              <a:t>GLM RESULTS/</a:t>
-            </a:r>
-            <a:r>
-              <a:rPr lang="en-US" err="1"/>
-              <a:t>DIscussion</a:t>
-            </a:r>
-            <a:r>
-              <a:rPr lang="en-US"/>
-              <a:t>:</a:t>
-            </a:r>
-          </a:p>
-        </p:txBody>
-      </p:sp>
-      <p:sp>
-        <p:nvSpPr>
-          <p:cNvPr id="3" name="Content Placeholder 2">
-            <a:extLst>
-              <a:ext uri="{FF2B5EF4-FFF2-40B4-BE49-F238E27FC236}">
-                <a16:creationId xmlns:a16="http://schemas.microsoft.com/office/drawing/2014/main" id="{A9E7DC2F-002C-433C-896A-F9187325A73D}"/>
-              </a:ext>
-            </a:extLst>
-          </p:cNvPr>
-          <p:cNvSpPr>
-            <a:spLocks noGrp="1"/>
-          </p:cNvSpPr>
-          <p:nvPr>
-            <p:ph idx="1"/>
-          </p:nvPr>
-        </p:nvSpPr>
-        <p:spPr>
-          <a:xfrm>
-            <a:off x="472345" y="943233"/>
-            <a:ext cx="10866025" cy="3959352"/>
-          </a:xfrm>
-        </p:spPr>
-        <p:txBody>
-          <a:bodyPr vert="horz" lIns="0" tIns="0" rIns="0" bIns="0" rtlCol="0" anchor="t">
-            <a:noAutofit/>
-          </a:bodyPr>
-          <a:lstStyle/>
-          <a:p>
-            <a:r>
-              <a:rPr lang="en-US" sz="1800"/>
-              <a:t>Poisson Regression not ideal for these data.</a:t>
-            </a:r>
-          </a:p>
-          <a:p>
-            <a:pPr lvl="1" indent="0"/>
-            <a:r>
-              <a:rPr lang="en-US" sz="1800"/>
-              <a:t>Poisson distribution assumes that the mean and variance are equal.</a:t>
-            </a:r>
-          </a:p>
-          <a:p>
-            <a:pPr lvl="2"/>
-            <a:r>
-              <a:rPr lang="en-US"/>
-              <a:t>Our data: 9.50 / 123.57 = </a:t>
-            </a:r>
-            <a:r>
-              <a:rPr lang="en-US">
-                <a:ea typeface="+mn-lt"/>
-                <a:cs typeface="+mn-lt"/>
-              </a:rPr>
-              <a:t>0.08    </a:t>
-            </a:r>
-            <a:r>
-              <a:rPr lang="en-US">
-                <a:solidFill>
-                  <a:schemeClr val="bg1">
-                    <a:lumMod val="50000"/>
-                  </a:schemeClr>
-                </a:solidFill>
-                <a:ea typeface="+mn-lt"/>
-                <a:cs typeface="+mn-lt"/>
-              </a:rPr>
-              <a:t>#  </a:t>
-            </a:r>
-            <a:r>
-              <a:rPr lang="en-US" i="1">
-                <a:solidFill>
-                  <a:schemeClr val="bg1">
-                    <a:lumMod val="50000"/>
-                  </a:schemeClr>
-                </a:solidFill>
-                <a:ea typeface="+mn-lt"/>
-                <a:cs typeface="+mn-lt"/>
-              </a:rPr>
-              <a:t>Overdispersion</a:t>
-            </a:r>
-            <a:r>
-              <a:rPr lang="en-US">
-                <a:solidFill>
-                  <a:schemeClr val="bg1">
-                    <a:lumMod val="50000"/>
-                  </a:schemeClr>
-                </a:solidFill>
-                <a:ea typeface="+mn-lt"/>
-                <a:cs typeface="+mn-lt"/>
-              </a:rPr>
-              <a:t>:: variance much higher than mean.</a:t>
-            </a:r>
-            <a:endParaRPr lang="en-US">
-              <a:solidFill>
-                <a:schemeClr val="bg1">
-                  <a:lumMod val="50000"/>
-                </a:schemeClr>
-              </a:solidFill>
-            </a:endParaRPr>
-          </a:p>
-          <a:p>
-            <a:pPr lvl="3"/>
-            <a:r>
-              <a:rPr lang="en-US" sz="1800"/>
-              <a:t>The responses are heteroskedastic.</a:t>
-            </a:r>
-          </a:p>
-          <a:p>
-            <a:pPr lvl="4"/>
-            <a:r>
-              <a:rPr lang="en-US" sz="1800"/>
-              <a:t>Variance in the response increases with population count.</a:t>
-            </a:r>
-            <a:endParaRPr lang="en-US" sz="1800" i="1"/>
-          </a:p>
-          <a:p>
-            <a:pPr lvl="1"/>
-            <a:r>
-              <a:rPr lang="en-US" sz="1800"/>
-              <a:t>Outliers a problem, even for a model that accounts for overdispersion.</a:t>
-            </a:r>
-          </a:p>
-          <a:p>
-            <a:pPr lvl="1"/>
-            <a:endParaRPr lang="en-US" sz="1800"/>
-          </a:p>
-          <a:p>
-            <a:pPr lvl="1"/>
-            <a:r>
-              <a:rPr lang="en-US" sz="1800">
-                <a:ea typeface="+mn-lt"/>
-                <a:cs typeface="+mn-lt"/>
-              </a:rPr>
-              <a:t>Responses are also spatially structured.</a:t>
-            </a:r>
-          </a:p>
-          <a:p>
-            <a:pPr lvl="2"/>
-            <a:r>
-              <a:rPr lang="en-US">
-                <a:ea typeface="+mn-lt"/>
-                <a:cs typeface="+mn-lt"/>
-              </a:rPr>
-              <a:t>Nearby counties have similar counts and rates of agencies and accidents.</a:t>
-            </a:r>
-          </a:p>
-          <a:p>
-            <a:pPr lvl="3"/>
-            <a:r>
-              <a:rPr lang="en-US" sz="1800">
-                <a:ea typeface="+mn-lt"/>
-                <a:cs typeface="+mn-lt"/>
-              </a:rPr>
-              <a:t>Counties don't represent independent sample units.</a:t>
-            </a:r>
-            <a:endParaRPr lang="en-US" sz="1800">
-              <a:solidFill>
-                <a:srgbClr val="000000"/>
-              </a:solidFill>
-              <a:ea typeface="+mn-lt"/>
-              <a:cs typeface="+mn-lt"/>
-            </a:endParaRPr>
-          </a:p>
-          <a:p>
-            <a:pPr lvl="3"/>
-            <a:endParaRPr lang="en-US" sz="1800">
-              <a:solidFill>
-                <a:srgbClr val="000000"/>
-              </a:solidFill>
-              <a:ea typeface="+mn-lt"/>
-              <a:cs typeface="+mn-lt"/>
-            </a:endParaRPr>
-          </a:p>
-          <a:p>
-            <a:pPr lvl="3">
-              <a:buFont typeface="Wingdings" panose="020B0604020202020204" pitchFamily="34" charset="0"/>
-              <a:buChar char="v"/>
-            </a:pPr>
-            <a:r>
-              <a:rPr lang="en-US" sz="1800">
-                <a:solidFill>
-                  <a:srgbClr val="000000"/>
-                </a:solidFill>
-              </a:rPr>
-              <a:t>Regression may not work well for these data....maybe local regression.</a:t>
-            </a:r>
-          </a:p>
-          <a:p>
-            <a:pPr lvl="3">
-              <a:buFont typeface="Wingdings" panose="020B0604020202020204" pitchFamily="34" charset="0"/>
-              <a:buChar char="v"/>
-            </a:pPr>
-            <a:r>
-              <a:rPr lang="en-US" sz="1800">
-                <a:solidFill>
-                  <a:srgbClr val="000000"/>
-                </a:solidFill>
-              </a:rPr>
-              <a:t>Need more predictors...not just accident rate.</a:t>
-            </a:r>
-          </a:p>
-          <a:p>
-            <a:pPr lvl="1"/>
-            <a:endParaRPr lang="en-US" sz="1800">
-              <a:solidFill>
-                <a:srgbClr val="000000"/>
-              </a:solidFill>
-            </a:endParaRPr>
-          </a:p>
-          <a:p>
-            <a:pPr>
-              <a:lnSpc>
-                <a:spcPct val="100000"/>
-              </a:lnSpc>
-              <a:spcBef>
-                <a:spcPts val="0"/>
-              </a:spcBef>
-            </a:pPr>
-            <a:endParaRPr lang="en-US" sz="1800">
-              <a:solidFill>
-                <a:srgbClr val="262626"/>
-              </a:solidFill>
-            </a:endParaRPr>
-          </a:p>
-          <a:p>
-            <a:pPr lvl="2"/>
-            <a:endParaRPr lang="en-US" sz="1800"/>
-          </a:p>
-          <a:p>
-            <a:pPr marL="457200" lvl="1" indent="0">
-              <a:buNone/>
-            </a:pPr>
-            <a:endParaRPr lang="en-US" sz="1800"/>
-          </a:p>
-          <a:p>
-            <a:pPr marL="457200" lvl="1" indent="0">
-              <a:buNone/>
-            </a:pPr>
-            <a:endParaRPr lang="en-US" sz="1800"/>
-          </a:p>
-          <a:p>
-            <a:pPr marL="1371600" lvl="3" indent="0">
-              <a:buNone/>
-            </a:pPr>
-            <a:endParaRPr lang="en-US" sz="1800"/>
-          </a:p>
-          <a:p>
-            <a:pPr marL="1371600" lvl="3" indent="0">
-              <a:buNone/>
-            </a:pPr>
-            <a:endParaRPr lang="en-US"/>
-          </a:p>
-          <a:p>
-            <a:pPr marL="457200" lvl="1" indent="0">
-              <a:buNone/>
-            </a:pPr>
-            <a:endParaRPr lang="en-US"/>
-          </a:p>
-          <a:p>
-            <a:pPr marL="457200" lvl="1" indent="0">
-              <a:buNone/>
-            </a:pPr>
-            <a:endParaRPr lang="en-US"/>
-          </a:p>
-        </p:txBody>
-      </p:sp>
-    </p:spTree>
-    <p:extLst>
-      <p:ext uri="{BB962C8B-B14F-4D97-AF65-F5344CB8AC3E}">
-        <p14:creationId xmlns:p14="http://schemas.microsoft.com/office/powerpoint/2010/main" val="631361570"/>
+        <p14:creationId xmlns:p14="http://schemas.microsoft.com/office/powerpoint/2010/main" val="1281254422"/>
       </p:ext>
     </p:extLst>
   </p:cSld>
@@ -7034,7 +6395,7 @@
           <p:cNvPr id="2" name="Title 1">
             <a:extLst>
               <a:ext uri="{FF2B5EF4-FFF2-40B4-BE49-F238E27FC236}">
-                <a16:creationId xmlns:a16="http://schemas.microsoft.com/office/drawing/2014/main" id="{B7E0DCEC-DF33-40E6-8379-B2B2C8E4EBD5}"/>
+                <a16:creationId xmlns:a16="http://schemas.microsoft.com/office/drawing/2014/main" id="{A1A0F93A-6A2E-41B7-9266-77DE4638D5EA}"/>
               </a:ext>
             </a:extLst>
           </p:cNvPr>
@@ -7047,6 +6408,328 @@
         </p:nvSpPr>
         <p:spPr>
           <a:xfrm>
+            <a:off x="472345" y="213377"/>
+            <a:ext cx="10241280" cy="642826"/>
+          </a:xfrm>
+        </p:spPr>
+        <p:txBody>
+          <a:bodyPr/>
+          <a:lstStyle/>
+          <a:p>
+            <a:r>
+              <a:rPr lang="en-US"/>
+              <a:t>GLM RESULTS/</a:t>
+            </a:r>
+            <a:r>
+              <a:rPr lang="en-US" err="1"/>
+              <a:t>DIscussion</a:t>
+            </a:r>
+            <a:r>
+              <a:rPr lang="en-US"/>
+              <a:t>:</a:t>
+            </a:r>
+          </a:p>
+        </p:txBody>
+      </p:sp>
+      <p:sp>
+        <p:nvSpPr>
+          <p:cNvPr id="3" name="Content Placeholder 2">
+            <a:extLst>
+              <a:ext uri="{FF2B5EF4-FFF2-40B4-BE49-F238E27FC236}">
+                <a16:creationId xmlns:a16="http://schemas.microsoft.com/office/drawing/2014/main" id="{A9E7DC2F-002C-433C-896A-F9187325A73D}"/>
+              </a:ext>
+            </a:extLst>
+          </p:cNvPr>
+          <p:cNvSpPr>
+            <a:spLocks noGrp="1"/>
+          </p:cNvSpPr>
+          <p:nvPr>
+            <p:ph idx="1"/>
+          </p:nvPr>
+        </p:nvSpPr>
+        <p:spPr>
+          <a:xfrm>
+            <a:off x="472345" y="943233"/>
+            <a:ext cx="10866025" cy="3959352"/>
+          </a:xfrm>
+        </p:spPr>
+        <p:txBody>
+          <a:bodyPr vert="horz" lIns="0" tIns="0" rIns="0" bIns="0" rtlCol="0" anchor="t">
+            <a:noAutofit/>
+          </a:bodyPr>
+          <a:lstStyle/>
+          <a:p>
+            <a:r>
+              <a:rPr lang="en-US" sz="1800" dirty="0"/>
+              <a:t>Poisson Regression not ideal for these data.</a:t>
+            </a:r>
+          </a:p>
+          <a:p>
+            <a:pPr lvl="1" indent="0"/>
+            <a:r>
+              <a:rPr lang="en-US" sz="1800" dirty="0"/>
+              <a:t>Poisson distribution assumes that the mean and variance are equal.</a:t>
+            </a:r>
+          </a:p>
+          <a:p>
+            <a:pPr lvl="2"/>
+            <a:r>
+              <a:rPr lang="en-US" dirty="0"/>
+              <a:t>Our data: (mean agency count : 9.50) / 123.57 (variance) = </a:t>
+            </a:r>
+            <a:r>
+              <a:rPr lang="en-US" dirty="0">
+                <a:ea typeface="+mn-lt"/>
+                <a:cs typeface="+mn-lt"/>
+              </a:rPr>
+              <a:t>0.08    </a:t>
+            </a:r>
+            <a:r>
+              <a:rPr lang="en-US" dirty="0">
+                <a:solidFill>
+                  <a:schemeClr val="bg1">
+                    <a:lumMod val="50000"/>
+                  </a:schemeClr>
+                </a:solidFill>
+                <a:ea typeface="+mn-lt"/>
+                <a:cs typeface="+mn-lt"/>
+              </a:rPr>
+              <a:t>#  </a:t>
+            </a:r>
+            <a:r>
+              <a:rPr lang="en-US" i="1" dirty="0">
+                <a:solidFill>
+                  <a:schemeClr val="bg1">
+                    <a:lumMod val="50000"/>
+                  </a:schemeClr>
+                </a:solidFill>
+                <a:ea typeface="+mn-lt"/>
+                <a:cs typeface="+mn-lt"/>
+              </a:rPr>
+              <a:t>Overdispersion</a:t>
+            </a:r>
+            <a:endParaRPr lang="en-US" dirty="0">
+              <a:solidFill>
+                <a:schemeClr val="bg1">
+                  <a:lumMod val="50000"/>
+                </a:schemeClr>
+              </a:solidFill>
+            </a:endParaRPr>
+          </a:p>
+          <a:p>
+            <a:pPr lvl="3"/>
+            <a:r>
+              <a:rPr lang="en-US" sz="1800" dirty="0"/>
+              <a:t>The responses are heteroskedastic.</a:t>
+            </a:r>
+          </a:p>
+          <a:p>
+            <a:pPr lvl="4"/>
+            <a:r>
+              <a:rPr lang="en-US" sz="1800" dirty="0"/>
+              <a:t>Variance in the response increases with population count.</a:t>
+            </a:r>
+            <a:endParaRPr lang="en-US" sz="1800" i="1" dirty="0"/>
+          </a:p>
+          <a:p>
+            <a:pPr lvl="1"/>
+            <a:r>
+              <a:rPr lang="en-US" sz="1800" dirty="0"/>
+              <a:t>Outliers a problem, even for a model that accounts for overdispersion.</a:t>
+            </a:r>
+          </a:p>
+          <a:p>
+            <a:pPr lvl="1"/>
+            <a:endParaRPr lang="en-US" sz="1800" dirty="0"/>
+          </a:p>
+          <a:p>
+            <a:pPr lvl="1"/>
+            <a:r>
+              <a:rPr lang="en-US" sz="1800" dirty="0">
+                <a:ea typeface="+mn-lt"/>
+                <a:cs typeface="+mn-lt"/>
+              </a:rPr>
+              <a:t>Responses are also spatially structured.</a:t>
+            </a:r>
+          </a:p>
+          <a:p>
+            <a:pPr lvl="2"/>
+            <a:r>
+              <a:rPr lang="en-US" dirty="0">
+                <a:ea typeface="+mn-lt"/>
+                <a:cs typeface="+mn-lt"/>
+              </a:rPr>
+              <a:t>Nearby counties have similar counts and rates of agencies and accidents.</a:t>
+            </a:r>
+          </a:p>
+          <a:p>
+            <a:pPr lvl="3"/>
+            <a:r>
+              <a:rPr lang="en-US" sz="1800" dirty="0">
+                <a:ea typeface="+mn-lt"/>
+                <a:cs typeface="+mn-lt"/>
+              </a:rPr>
+              <a:t>Counties don't represent independent sample units.</a:t>
+            </a:r>
+            <a:endParaRPr lang="en-US" sz="1800" dirty="0">
+              <a:solidFill>
+                <a:srgbClr val="000000"/>
+              </a:solidFill>
+              <a:ea typeface="+mn-lt"/>
+              <a:cs typeface="+mn-lt"/>
+            </a:endParaRPr>
+          </a:p>
+          <a:p>
+            <a:pPr lvl="3"/>
+            <a:endParaRPr lang="en-US" sz="1800" dirty="0">
+              <a:solidFill>
+                <a:srgbClr val="000000"/>
+              </a:solidFill>
+              <a:ea typeface="+mn-lt"/>
+              <a:cs typeface="+mn-lt"/>
+            </a:endParaRPr>
+          </a:p>
+          <a:p>
+            <a:pPr lvl="3">
+              <a:buFont typeface="Wingdings" panose="020B0604020202020204" pitchFamily="34" charset="0"/>
+              <a:buChar char="v"/>
+            </a:pPr>
+            <a:r>
+              <a:rPr lang="en-US" sz="1800" dirty="0">
+                <a:solidFill>
+                  <a:srgbClr val="000000"/>
+                </a:solidFill>
+              </a:rPr>
+              <a:t>Regression may not work well for these data....maybe local regression.</a:t>
+            </a:r>
+          </a:p>
+          <a:p>
+            <a:pPr lvl="3">
+              <a:buFont typeface="Wingdings" panose="020B0604020202020204" pitchFamily="34" charset="0"/>
+              <a:buChar char="v"/>
+            </a:pPr>
+            <a:r>
+              <a:rPr lang="en-US" sz="1800" dirty="0">
+                <a:solidFill>
+                  <a:srgbClr val="000000"/>
+                </a:solidFill>
+              </a:rPr>
+              <a:t>Need more predictors...not just accident rate.</a:t>
+            </a:r>
+          </a:p>
+          <a:p>
+            <a:pPr lvl="1"/>
+            <a:endParaRPr lang="en-US" sz="1800" dirty="0">
+              <a:solidFill>
+                <a:srgbClr val="000000"/>
+              </a:solidFill>
+            </a:endParaRPr>
+          </a:p>
+          <a:p>
+            <a:pPr>
+              <a:lnSpc>
+                <a:spcPct val="100000"/>
+              </a:lnSpc>
+              <a:spcBef>
+                <a:spcPts val="0"/>
+              </a:spcBef>
+            </a:pPr>
+            <a:endParaRPr lang="en-US" sz="1800" dirty="0">
+              <a:solidFill>
+                <a:srgbClr val="262626"/>
+              </a:solidFill>
+            </a:endParaRPr>
+          </a:p>
+          <a:p>
+            <a:pPr lvl="2"/>
+            <a:endParaRPr lang="en-US" sz="1800" dirty="0"/>
+          </a:p>
+          <a:p>
+            <a:pPr marL="457200" lvl="1" indent="0">
+              <a:buNone/>
+            </a:pPr>
+            <a:endParaRPr lang="en-US" sz="1800" dirty="0"/>
+          </a:p>
+          <a:p>
+            <a:pPr marL="457200" lvl="1" indent="0">
+              <a:buNone/>
+            </a:pPr>
+            <a:endParaRPr lang="en-US" sz="1800" dirty="0"/>
+          </a:p>
+          <a:p>
+            <a:pPr marL="1371600" lvl="3" indent="0">
+              <a:buNone/>
+            </a:pPr>
+            <a:endParaRPr lang="en-US" sz="1800" dirty="0"/>
+          </a:p>
+          <a:p>
+            <a:pPr marL="1371600" lvl="3" indent="0">
+              <a:buNone/>
+            </a:pPr>
+            <a:endParaRPr lang="en-US" dirty="0"/>
+          </a:p>
+          <a:p>
+            <a:pPr marL="457200" lvl="1" indent="0">
+              <a:buNone/>
+            </a:pPr>
+            <a:endParaRPr lang="en-US" dirty="0"/>
+          </a:p>
+          <a:p>
+            <a:pPr marL="457200" lvl="1" indent="0">
+              <a:buNone/>
+            </a:pPr>
+            <a:endParaRPr lang="en-US" dirty="0"/>
+          </a:p>
+        </p:txBody>
+      </p:sp>
+    </p:spTree>
+    <p:extLst>
+      <p:ext uri="{BB962C8B-B14F-4D97-AF65-F5344CB8AC3E}">
+        <p14:creationId xmlns:p14="http://schemas.microsoft.com/office/powerpoint/2010/main" val="631361570"/>
+      </p:ext>
+    </p:extLst>
+  </p:cSld>
+  <p:clrMapOvr>
+    <a:masterClrMapping/>
+  </p:clrMapOvr>
+</p:sld>
+</file>
+
+<file path=ppt/slides/slide18.xml><?xml version="1.0" encoding="utf-8"?>
+<p:sld xmlns:a="http://schemas.openxmlformats.org/drawingml/2006/main" xmlns:r="http://schemas.openxmlformats.org/officeDocument/2006/relationships" xmlns:p="http://schemas.openxmlformats.org/presentationml/2006/main">
+  <p:cSld>
+    <p:spTree>
+      <p:nvGrpSpPr>
+        <p:cNvPr id="1" name=""/>
+        <p:cNvGrpSpPr/>
+        <p:nvPr/>
+      </p:nvGrpSpPr>
+      <p:grpSpPr>
+        <a:xfrm>
+          <a:off x="0" y="0"/>
+          <a:ext cx="0" cy="0"/>
+          <a:chOff x="0" y="0"/>
+          <a:chExt cx="0" cy="0"/>
+        </a:xfrm>
+      </p:grpSpPr>
+      <p:sp>
+        <p:nvSpPr>
+          <p:cNvPr id="2" name="Title 1">
+            <a:extLst>
+              <a:ext uri="{FF2B5EF4-FFF2-40B4-BE49-F238E27FC236}">
+                <a16:creationId xmlns:a16="http://schemas.microsoft.com/office/drawing/2014/main" id="{B7E0DCEC-DF33-40E6-8379-B2B2C8E4EBD5}"/>
+              </a:ext>
+            </a:extLst>
+          </p:cNvPr>
+          <p:cNvSpPr>
+            <a:spLocks noGrp="1"/>
+          </p:cNvSpPr>
+          <p:nvPr>
+            <p:ph type="title"/>
+          </p:nvPr>
+        </p:nvSpPr>
+        <p:spPr>
+          <a:xfrm>
             <a:off x="1134954" y="170783"/>
             <a:ext cx="10241280" cy="1234440"/>
           </a:xfrm>
@@ -7134,7 +6817,7 @@
             <a:pPr lvl="1"/>
             <a:r>
               <a:rPr lang="en-US"/>
-              <a:t>Surprisingly low rates in urban areas</a:t>
+              <a:t>Surprisingly low rates in urban rates</a:t>
             </a:r>
           </a:p>
         </p:txBody>
@@ -7218,7 +6901,7 @@
 </p:sld>
 </file>
 
-<file path=ppt/slides/slide18.xml><?xml version="1.0" encoding="utf-8"?>
+<file path=ppt/slides/slide19.xml><?xml version="1.0" encoding="utf-8"?>
 <p:sld xmlns:a="http://schemas.openxmlformats.org/drawingml/2006/main" xmlns:r="http://schemas.openxmlformats.org/officeDocument/2006/relationships" xmlns:p="http://schemas.openxmlformats.org/presentationml/2006/main">
   <p:cSld>
     <p:spTree>
@@ -7695,7 +7378,204 @@
 </p:sld>
 </file>
 
-<file path=ppt/slides/slide19.xml><?xml version="1.0" encoding="utf-8"?>
+<file path=ppt/slides/slide2.xml><?xml version="1.0" encoding="utf-8"?>
+<p:sld xmlns:a="http://schemas.openxmlformats.org/drawingml/2006/main" xmlns:r="http://schemas.openxmlformats.org/officeDocument/2006/relationships" xmlns:p="http://schemas.openxmlformats.org/presentationml/2006/main">
+  <p:cSld>
+    <p:spTree>
+      <p:nvGrpSpPr>
+        <p:cNvPr id="1" name=""/>
+        <p:cNvGrpSpPr/>
+        <p:nvPr/>
+      </p:nvGrpSpPr>
+      <p:grpSpPr>
+        <a:xfrm>
+          <a:off x="0" y="0"/>
+          <a:ext cx="0" cy="0"/>
+          <a:chOff x="0" y="0"/>
+          <a:chExt cx="0" cy="0"/>
+        </a:xfrm>
+      </p:grpSpPr>
+      <p:sp>
+        <p:nvSpPr>
+          <p:cNvPr id="2" name="Title 1">
+            <a:extLst>
+              <a:ext uri="{FF2B5EF4-FFF2-40B4-BE49-F238E27FC236}">
+                <a16:creationId xmlns:a16="http://schemas.microsoft.com/office/drawing/2014/main" id="{F5E22433-D9C2-4AA0-BE1F-EAB376308C9A}"/>
+              </a:ext>
+            </a:extLst>
+          </p:cNvPr>
+          <p:cNvSpPr>
+            <a:spLocks noGrp="1"/>
+          </p:cNvSpPr>
+          <p:nvPr>
+            <p:ph type="title"/>
+          </p:nvPr>
+        </p:nvSpPr>
+        <p:spPr>
+          <a:xfrm>
+            <a:off x="900113" y="381191"/>
+            <a:ext cx="10241280" cy="714184"/>
+          </a:xfrm>
+        </p:spPr>
+        <p:txBody>
+          <a:bodyPr/>
+          <a:lstStyle/>
+          <a:p>
+            <a:r>
+              <a:rPr lang="en-US"/>
+              <a:t>Project Summary</a:t>
+            </a:r>
+          </a:p>
+        </p:txBody>
+      </p:sp>
+      <p:sp>
+        <p:nvSpPr>
+          <p:cNvPr id="3" name="Content Placeholder 2">
+            <a:extLst>
+              <a:ext uri="{FF2B5EF4-FFF2-40B4-BE49-F238E27FC236}">
+                <a16:creationId xmlns:a16="http://schemas.microsoft.com/office/drawing/2014/main" id="{730BD5E2-984D-41DA-9A19-6608C260A141}"/>
+              </a:ext>
+            </a:extLst>
+          </p:cNvPr>
+          <p:cNvSpPr>
+            <a:spLocks noGrp="1"/>
+          </p:cNvSpPr>
+          <p:nvPr>
+            <p:ph idx="1"/>
+          </p:nvPr>
+        </p:nvSpPr>
+        <p:spPr>
+          <a:xfrm>
+            <a:off x="794385" y="1352550"/>
+            <a:ext cx="10922137" cy="4654707"/>
+          </a:xfrm>
+        </p:spPr>
+        <p:txBody>
+          <a:bodyPr vert="horz" lIns="0" tIns="0" rIns="0" bIns="0" rtlCol="0" anchor="t">
+            <a:normAutofit/>
+          </a:bodyPr>
+          <a:lstStyle/>
+          <a:p>
+            <a:pPr marL="0" indent="0">
+              <a:buNone/>
+            </a:pPr>
+            <a:r>
+              <a:rPr lang="en-US" sz="2400"/>
+              <a:t>Distribution of (auto*) insurance companies, by county, in Georgia, USA relative to...</a:t>
+            </a:r>
+          </a:p>
+          <a:p>
+            <a:r>
+              <a:rPr lang="en-US" sz="2400"/>
+              <a:t>Population size (2019).</a:t>
+            </a:r>
+          </a:p>
+          <a:p>
+            <a:r>
+              <a:rPr lang="en-US" sz="2400"/>
+              <a:t>Number of car accidents (from 01-Jan-2017 through 23-Aug-2019).</a:t>
+            </a:r>
+          </a:p>
+          <a:p>
+            <a:pPr marL="0" indent="0">
+              <a:buNone/>
+            </a:pPr>
+            <a:endParaRPr lang="en-US" sz="2600"/>
+          </a:p>
+          <a:p>
+            <a:endParaRPr lang="en-US"/>
+          </a:p>
+          <a:p>
+            <a:endParaRPr lang="en-US"/>
+          </a:p>
+          <a:p>
+            <a:pPr marL="0" indent="0">
+              <a:buNone/>
+            </a:pPr>
+            <a:endParaRPr lang="en-US"/>
+          </a:p>
+          <a:p>
+            <a:pPr marL="0" indent="0">
+              <a:buNone/>
+            </a:pPr>
+            <a:endParaRPr lang="en-US"/>
+          </a:p>
+        </p:txBody>
+      </p:sp>
+      <p:pic>
+        <p:nvPicPr>
+          <p:cNvPr id="6" name="Picture 5">
+            <a:extLst>
+              <a:ext uri="{FF2B5EF4-FFF2-40B4-BE49-F238E27FC236}">
+                <a16:creationId xmlns:a16="http://schemas.microsoft.com/office/drawing/2014/main" id="{A9CBD36B-FD00-45AE-8C2E-92805EC0E0F6}"/>
+              </a:ext>
+            </a:extLst>
+          </p:cNvPr>
+          <p:cNvPicPr>
+            <a:picLocks noChangeAspect="1"/>
+          </p:cNvPicPr>
+          <p:nvPr/>
+        </p:nvPicPr>
+        <p:blipFill>
+          <a:blip r:embed="rId2"/>
+          <a:stretch>
+            <a:fillRect/>
+          </a:stretch>
+        </p:blipFill>
+        <p:spPr>
+          <a:xfrm>
+            <a:off x="1794640" y="3078041"/>
+            <a:ext cx="3113873" cy="3108960"/>
+          </a:xfrm>
+          <a:prstGeom prst="rect">
+            <a:avLst/>
+          </a:prstGeom>
+        </p:spPr>
+      </p:pic>
+      <p:pic>
+        <p:nvPicPr>
+          <p:cNvPr id="4" name="Picture 4" descr="Logo, company name&#10;&#10;Description automatically generated">
+            <a:extLst>
+              <a:ext uri="{FF2B5EF4-FFF2-40B4-BE49-F238E27FC236}">
+                <a16:creationId xmlns:a16="http://schemas.microsoft.com/office/drawing/2014/main" id="{6D0F463E-039D-4AC5-937C-0F1CD888F6E3}"/>
+              </a:ext>
+            </a:extLst>
+          </p:cNvPr>
+          <p:cNvPicPr>
+            <a:picLocks noChangeAspect="1"/>
+          </p:cNvPicPr>
+          <p:nvPr/>
+        </p:nvPicPr>
+        <p:blipFill>
+          <a:blip r:embed="rId3"/>
+          <a:stretch>
+            <a:fillRect/>
+          </a:stretch>
+        </p:blipFill>
+        <p:spPr>
+          <a:xfrm>
+            <a:off x="5846805" y="3197137"/>
+            <a:ext cx="4926226" cy="2770321"/>
+          </a:xfrm>
+          <a:prstGeom prst="rect">
+            <a:avLst/>
+          </a:prstGeom>
+        </p:spPr>
+      </p:pic>
+    </p:spTree>
+    <p:extLst>
+      <p:ext uri="{BB962C8B-B14F-4D97-AF65-F5344CB8AC3E}">
+        <p14:creationId xmlns:p14="http://schemas.microsoft.com/office/powerpoint/2010/main" val="627455011"/>
+      </p:ext>
+    </p:extLst>
+  </p:cSld>
+  <p:clrMapOvr>
+    <a:masterClrMapping/>
+  </p:clrMapOvr>
+</p:sld>
+</file>
+
+<file path=ppt/slides/slide20.xml><?xml version="1.0" encoding="utf-8"?>
 <p:sld xmlns:a="http://schemas.openxmlformats.org/drawingml/2006/main" xmlns:r="http://schemas.openxmlformats.org/officeDocument/2006/relationships" xmlns:p="http://schemas.openxmlformats.org/presentationml/2006/main">
   <p:cSld>
     <p:spTree>
@@ -7744,10 +7624,10 @@
       </p:pic>
       <p:sp>
         <p:nvSpPr>
-          <p:cNvPr id="5" name="TextBox 4">
-            <a:extLst>
-              <a:ext uri="{FF2B5EF4-FFF2-40B4-BE49-F238E27FC236}">
-                <a16:creationId xmlns:a16="http://schemas.microsoft.com/office/drawing/2014/main" id="{28ED3A3C-0B28-4CD8-848B-431CD3BA0156}"/>
+          <p:cNvPr id="6" name="TextBox 5">
+            <a:extLst>
+              <a:ext uri="{FF2B5EF4-FFF2-40B4-BE49-F238E27FC236}">
+                <a16:creationId xmlns:a16="http://schemas.microsoft.com/office/drawing/2014/main" id="{C108C203-B87C-4955-8E92-7B469E52F9BB}"/>
               </a:ext>
             </a:extLst>
           </p:cNvPr>
@@ -7756,8 +7636,8 @@
         </p:nvSpPr>
         <p:spPr>
           <a:xfrm>
-            <a:off x="519112" y="688563"/>
-            <a:ext cx="3276602" cy="1200329"/>
+            <a:off x="501098" y="1918957"/>
+            <a:ext cx="3294616" cy="646331"/>
           </a:xfrm>
           <a:prstGeom prst="rect">
             <a:avLst/>
@@ -7765,83 +7645,6 @@
           <a:noFill/>
         </p:spPr>
         <p:txBody>
-          <a:bodyPr wrap="square" lIns="91440" tIns="45720" rIns="91440" bIns="45720" rtlCol="0" anchor="t">
-            <a:spAutoFit/>
-          </a:bodyPr>
-          <a:lstStyle/>
-          <a:p>
-            <a:r>
-              <a:rPr lang="en-US" b="1">
-                <a:solidFill>
-                  <a:schemeClr val="bg1">
-                    <a:lumMod val="85000"/>
-                  </a:schemeClr>
-                </a:solidFill>
-              </a:rPr>
-              <a:t>US Census Burrow 2019</a:t>
-            </a:r>
-          </a:p>
-          <a:p>
-            <a:r>
-              <a:rPr lang="en-US">
-                <a:solidFill>
-                  <a:schemeClr val="bg1">
-                    <a:lumMod val="85000"/>
-                  </a:schemeClr>
-                </a:solidFill>
-              </a:rPr>
-              <a:t>(GA counties)</a:t>
-            </a:r>
-          </a:p>
-          <a:p>
-            <a:r>
-              <a:rPr lang="en-US">
-                <a:solidFill>
-                  <a:schemeClr val="bg1">
-                    <a:lumMod val="85000"/>
-                  </a:schemeClr>
-                </a:solidFill>
-              </a:rPr>
-              <a:t>(GA cities/towns/city-counties)</a:t>
-            </a:r>
-          </a:p>
-          <a:p>
-            <a:r>
-              <a:rPr lang="en-US">
-                <a:solidFill>
-                  <a:schemeClr val="bg1">
-                    <a:lumMod val="85000"/>
-                  </a:schemeClr>
-                </a:solidFill>
-              </a:rPr>
-              <a:t>(.csv)</a:t>
-            </a:r>
-          </a:p>
-        </p:txBody>
-      </p:sp>
-      <p:sp>
-        <p:nvSpPr>
-          <p:cNvPr id="6" name="TextBox 5">
-            <a:extLst>
-              <a:ext uri="{FF2B5EF4-FFF2-40B4-BE49-F238E27FC236}">
-                <a16:creationId xmlns:a16="http://schemas.microsoft.com/office/drawing/2014/main" id="{C108C203-B87C-4955-8E92-7B469E52F9BB}"/>
-              </a:ext>
-            </a:extLst>
-          </p:cNvPr>
-          <p:cNvSpPr txBox="1"/>
-          <p:nvPr/>
-        </p:nvSpPr>
-        <p:spPr>
-          <a:xfrm>
-            <a:off x="501098" y="1918957"/>
-            <a:ext cx="3294616" cy="646331"/>
-          </a:xfrm>
-          <a:prstGeom prst="rect">
-            <a:avLst/>
-          </a:prstGeom>
-          <a:noFill/>
-        </p:spPr>
-        <p:txBody>
           <a:bodyPr wrap="square" rtlCol="0">
             <a:spAutoFit/>
           </a:bodyPr>
@@ -7865,103 +7668,6 @@
             <a:r>
               <a:rPr lang="en-US"/>
               <a:t>)</a:t>
-            </a:r>
-          </a:p>
-        </p:txBody>
-      </p:sp>
-      <p:sp>
-        <p:nvSpPr>
-          <p:cNvPr id="7" name="TextBox 6">
-            <a:extLst>
-              <a:ext uri="{FF2B5EF4-FFF2-40B4-BE49-F238E27FC236}">
-                <a16:creationId xmlns:a16="http://schemas.microsoft.com/office/drawing/2014/main" id="{531717D6-2538-4F31-ADAD-88A2C1651DBD}"/>
-              </a:ext>
-            </a:extLst>
-          </p:cNvPr>
-          <p:cNvSpPr txBox="1"/>
-          <p:nvPr/>
-        </p:nvSpPr>
-        <p:spPr>
-          <a:xfrm>
-            <a:off x="519112" y="3540251"/>
-            <a:ext cx="4267200" cy="1200329"/>
-          </a:xfrm>
-          <a:prstGeom prst="rect">
-            <a:avLst/>
-          </a:prstGeom>
-          <a:noFill/>
-        </p:spPr>
-        <p:txBody>
-          <a:bodyPr wrap="square" lIns="91440" tIns="45720" rIns="91440" bIns="45720" rtlCol="0" anchor="t">
-            <a:spAutoFit/>
-          </a:bodyPr>
-          <a:lstStyle/>
-          <a:p>
-            <a:r>
-              <a:rPr lang="en-US" b="1">
-                <a:solidFill>
-                  <a:schemeClr val="bg1">
-                    <a:lumMod val="75000"/>
-                  </a:schemeClr>
-                </a:solidFill>
-              </a:rPr>
-              <a:t>Kaggle</a:t>
-            </a:r>
-          </a:p>
-          <a:p>
-            <a:r>
-              <a:rPr lang="en-US" b="1">
-                <a:solidFill>
-                  <a:schemeClr val="bg1">
-                    <a:lumMod val="75000"/>
-                  </a:schemeClr>
-                </a:solidFill>
-              </a:rPr>
-              <a:t>US Accidents (</a:t>
-            </a:r>
-            <a:r>
-              <a:rPr lang="en-US" b="1" err="1">
-                <a:solidFill>
-                  <a:schemeClr val="bg1">
-                    <a:lumMod val="75000"/>
-                  </a:schemeClr>
-                </a:solidFill>
-              </a:rPr>
-              <a:t>Moosavi</a:t>
-            </a:r>
-            <a:r>
-              <a:rPr lang="en-US" b="1">
-                <a:solidFill>
-                  <a:schemeClr val="bg1">
-                    <a:lumMod val="75000"/>
-                  </a:schemeClr>
-                </a:solidFill>
-              </a:rPr>
-              <a:t> et al. 2019)</a:t>
-            </a:r>
-          </a:p>
-          <a:p>
-            <a:r>
-              <a:rPr lang="en-US">
-                <a:solidFill>
-                  <a:schemeClr val="bg1">
-                    <a:lumMod val="75000"/>
-                  </a:schemeClr>
-                </a:solidFill>
-              </a:rPr>
-              <a:t>4.2 million records</a:t>
-            </a:r>
-          </a:p>
-          <a:p>
-            <a:r>
-              <a:rPr lang="en-US">
-                <a:solidFill>
-                  <a:schemeClr val="bg1">
-                    <a:lumMod val="75000"/>
-                  </a:schemeClr>
-                </a:solidFill>
-              </a:rPr>
-              <a:t>(.csv)</a:t>
             </a:r>
           </a:p>
         </p:txBody>
@@ -8420,9 +8126,9 @@
           <p:nvPr/>
         </p:nvCxnSpPr>
         <p:spPr>
-          <a:xfrm>
-            <a:off x="1863913" y="2765060"/>
-            <a:ext cx="972580" cy="426227"/>
+          <a:xfrm flipH="1">
+            <a:off x="1119908" y="2680385"/>
+            <a:ext cx="439743" cy="621078"/>
           </a:xfrm>
           <a:prstGeom prst="straightConnector1">
             <a:avLst/>
@@ -8451,10 +8157,10 @@
       </p:cxnSp>
       <p:sp>
         <p:nvSpPr>
-          <p:cNvPr id="10" name="TextBox 9">
-            <a:extLst>
-              <a:ext uri="{FF2B5EF4-FFF2-40B4-BE49-F238E27FC236}">
-                <a16:creationId xmlns:a16="http://schemas.microsoft.com/office/drawing/2014/main" id="{D394DDF5-32B9-4EF8-B110-CF44A743A2AD}"/>
+          <p:cNvPr id="23" name="TextBox 22">
+            <a:extLst>
+              <a:ext uri="{FF2B5EF4-FFF2-40B4-BE49-F238E27FC236}">
+                <a16:creationId xmlns:a16="http://schemas.microsoft.com/office/drawing/2014/main" id="{E8509F4E-632D-4651-AD48-F969689A45AD}"/>
               </a:ext>
             </a:extLst>
           </p:cNvPr>
@@ -8463,67 +8169,13 @@
         </p:nvSpPr>
         <p:spPr>
           <a:xfrm>
-            <a:off x="2845959" y="2976979"/>
-            <a:ext cx="2209797" cy="646331"/>
+            <a:off x="1339707" y="2931231"/>
+            <a:ext cx="419100" cy="369332"/>
           </a:xfrm>
           <a:prstGeom prst="rect">
             <a:avLst/>
           </a:prstGeom>
           <a:noFill/>
-          <a:ln>
-            <a:solidFill>
-              <a:srgbClr val="C00000"/>
-            </a:solidFill>
-          </a:ln>
-        </p:spPr>
-        <p:txBody>
-          <a:bodyPr wrap="square">
-            <a:spAutoFit/>
-          </a:bodyPr>
-          <a:lstStyle/>
-          <a:p>
-            <a:r>
-              <a:rPr lang="en-US">
-                <a:solidFill>
-                  <a:srgbClr val="C00000"/>
-                </a:solidFill>
-              </a:rPr>
-              <a:t>Reverse geocode</a:t>
-            </a:r>
-          </a:p>
-          <a:p>
-            <a:r>
-              <a:rPr lang="en-US">
-                <a:solidFill>
-                  <a:srgbClr val="C00000"/>
-                </a:solidFill>
-              </a:rPr>
-              <a:t>(to get county name)</a:t>
-            </a:r>
-          </a:p>
-        </p:txBody>
-      </p:sp>
-      <p:sp>
-        <p:nvSpPr>
-          <p:cNvPr id="23" name="TextBox 22">
-            <a:extLst>
-              <a:ext uri="{FF2B5EF4-FFF2-40B4-BE49-F238E27FC236}">
-                <a16:creationId xmlns:a16="http://schemas.microsoft.com/office/drawing/2014/main" id="{E8509F4E-632D-4651-AD48-F969689A45AD}"/>
-              </a:ext>
-            </a:extLst>
-          </p:cNvPr>
-          <p:cNvSpPr txBox="1"/>
-          <p:nvPr/>
-        </p:nvSpPr>
-        <p:spPr>
-          <a:xfrm>
-            <a:off x="1951230" y="2934125"/>
-            <a:ext cx="419100" cy="369332"/>
-          </a:xfrm>
-          <a:prstGeom prst="rect">
-            <a:avLst/>
-          </a:prstGeom>
-          <a:noFill/>
         </p:spPr>
         <p:txBody>
           <a:bodyPr wrap="square" lIns="91440" tIns="45720" rIns="91440" bIns="45720" rtlCol="0" anchor="t">
@@ -8533,7 +8185,7 @@
           <a:p>
             <a:pPr algn="ctr"/>
             <a:r>
-              <a:rPr lang="en-US">
+              <a:rPr lang="en-US" dirty="0">
                 <a:ea typeface="+mn-lt"/>
                 <a:cs typeface="+mn-lt"/>
               </a:rPr>
@@ -8556,8 +8208,8 @@
         </p:nvSpPr>
         <p:spPr>
           <a:xfrm>
-            <a:off x="3952934" y="3673691"/>
-            <a:ext cx="3282751" cy="584775"/>
+            <a:off x="675384" y="3469761"/>
+            <a:ext cx="3687066" cy="584775"/>
           </a:xfrm>
           <a:prstGeom prst="rect">
             <a:avLst/>
@@ -8574,28 +8226,28 @@
           <a:lstStyle/>
           <a:p>
             <a:r>
-              <a:rPr lang="en-US"/>
+              <a:rPr lang="en-US" dirty="0"/>
               <a:t>1266 rows</a:t>
             </a:r>
             <a:r>
-              <a:rPr lang="en-US" sz="1400"/>
+              <a:rPr lang="en-US" sz="1400" dirty="0"/>
               <a:t> </a:t>
             </a:r>
           </a:p>
           <a:p>
             <a:r>
-              <a:rPr lang="en-US" sz="1400"/>
-              <a:t>(no out of state, prior to final cleaning)</a:t>
-            </a:r>
-          </a:p>
-        </p:txBody>
-      </p:sp>
-      <p:sp>
-        <p:nvSpPr>
-          <p:cNvPr id="26" name="TextBox 25">
-            <a:extLst>
-              <a:ext uri="{FF2B5EF4-FFF2-40B4-BE49-F238E27FC236}">
-                <a16:creationId xmlns:a16="http://schemas.microsoft.com/office/drawing/2014/main" id="{90A5691E-A009-45A6-AB81-C0390644F134}"/>
+              <a:rPr lang="en-US" sz="1400" dirty="0"/>
+              <a:t>(In state of Georgia)</a:t>
+            </a:r>
+          </a:p>
+        </p:txBody>
+      </p:sp>
+      <p:sp>
+        <p:nvSpPr>
+          <p:cNvPr id="16" name="TextBox 15">
+            <a:extLst>
+              <a:ext uri="{FF2B5EF4-FFF2-40B4-BE49-F238E27FC236}">
+                <a16:creationId xmlns:a16="http://schemas.microsoft.com/office/drawing/2014/main" id="{EE0D8A2B-F867-43CE-A332-0992F8BE8A01}"/>
               </a:ext>
             </a:extLst>
           </p:cNvPr>
@@ -8603,9 +8255,9 @@
           <p:nvPr/>
         </p:nvSpPr>
         <p:spPr>
-          <a:xfrm rot="1320000">
-            <a:off x="-377947" y="2836730"/>
-            <a:ext cx="3285993" cy="646331"/>
+          <a:xfrm>
+            <a:off x="164246" y="114126"/>
+            <a:ext cx="2519848" cy="830997"/>
           </a:xfrm>
           <a:prstGeom prst="rect">
             <a:avLst/>
@@ -8621,35 +8273,39 @@
           </a:bodyPr>
           <a:lstStyle/>
           <a:p>
-            <a:pPr algn="ctr"/>
-            <a:r>
-              <a:rPr lang="en-US" b="1" i="1">
+            <a:r>
+              <a:rPr lang="en-US" sz="1600" b="1" dirty="0">
                 <a:solidFill>
-                  <a:srgbClr val="0070C0"/>
+                  <a:srgbClr val="C00000"/>
                 </a:solidFill>
               </a:rPr>
-              <a:t>Spatial join instead!</a:t>
-            </a:r>
-          </a:p>
-          <a:p>
-            <a:pPr algn="ctr"/>
-            <a:r>
-              <a:rPr lang="en-US" b="1" i="1">
+              <a:t>Use systematic grid of </a:t>
+            </a:r>
+            <a:r>
+              <a:rPr lang="en-US" sz="1600" b="1" dirty="0" err="1">
                 <a:solidFill>
-                  <a:srgbClr val="0070C0"/>
+                  <a:srgbClr val="C00000"/>
                 </a:solidFill>
               </a:rPr>
-              <a:t>(no reverse geocoding)</a:t>
-            </a:r>
-          </a:p>
-        </p:txBody>
-      </p:sp>
-      <p:sp>
-        <p:nvSpPr>
-          <p:cNvPr id="16" name="TextBox 15">
-            <a:extLst>
-              <a:ext uri="{FF2B5EF4-FFF2-40B4-BE49-F238E27FC236}">
-                <a16:creationId xmlns:a16="http://schemas.microsoft.com/office/drawing/2014/main" id="{EE0D8A2B-F867-43CE-A332-0992F8BE8A01}"/>
+              <a:t>ponts</a:t>
+            </a:r>
+            <a:r>
+              <a:rPr lang="en-US" sz="1600" b="1" dirty="0">
+                <a:solidFill>
+                  <a:srgbClr val="C00000"/>
+                </a:solidFill>
+              </a:rPr>
+              <a:t> (instead of cities) in places search.</a:t>
+            </a:r>
+          </a:p>
+        </p:txBody>
+      </p:sp>
+      <p:sp>
+        <p:nvSpPr>
+          <p:cNvPr id="24" name="TextBox 23">
+            <a:extLst>
+              <a:ext uri="{FF2B5EF4-FFF2-40B4-BE49-F238E27FC236}">
+                <a16:creationId xmlns:a16="http://schemas.microsoft.com/office/drawing/2014/main" id="{54A5D4A6-075D-4D57-85EB-D8E4AE1E4E39}"/>
               </a:ext>
             </a:extLst>
           </p:cNvPr>
@@ -8658,8 +8314,8 @@
         </p:nvSpPr>
         <p:spPr>
           <a:xfrm>
-            <a:off x="6508057" y="114561"/>
-            <a:ext cx="9058401" cy="400110"/>
+            <a:off x="134448" y="2629502"/>
+            <a:ext cx="1333049" cy="738664"/>
           </a:xfrm>
           <a:prstGeom prst="rect">
             <a:avLst/>
@@ -8676,22 +8332,18 @@
           <a:lstStyle/>
           <a:p>
             <a:r>
-              <a:rPr lang="en-US" sz="2000" b="1">
-                <a:solidFill>
-                  <a:srgbClr val="C00000"/>
-                </a:solidFill>
-              </a:rPr>
-              <a:t>Use optimized grid instead of cities in places search.</a:t>
-            </a:r>
-          </a:p>
-        </p:txBody>
-      </p:sp>
-      <p:sp>
-        <p:nvSpPr>
-          <p:cNvPr id="31" name="TextBox 30">
-            <a:extLst>
-              <a:ext uri="{FF2B5EF4-FFF2-40B4-BE49-F238E27FC236}">
-                <a16:creationId xmlns:a16="http://schemas.microsoft.com/office/drawing/2014/main" id="{C48FBFA6-24FC-400C-A909-BCB2624A5A71}"/>
+              <a:rPr lang="en-US" sz="1400" dirty="0"/>
+              <a:t>Reverse Geocode for county.</a:t>
+            </a:r>
+          </a:p>
+        </p:txBody>
+      </p:sp>
+      <p:sp>
+        <p:nvSpPr>
+          <p:cNvPr id="11" name="TextBox 10">
+            <a:extLst>
+              <a:ext uri="{FF2B5EF4-FFF2-40B4-BE49-F238E27FC236}">
+                <a16:creationId xmlns:a16="http://schemas.microsoft.com/office/drawing/2014/main" id="{C61C62EC-2A2E-47D2-BD24-07D778E8BA91}"/>
               </a:ext>
             </a:extLst>
           </p:cNvPr>
@@ -8700,8 +8352,8 @@
         </p:nvSpPr>
         <p:spPr>
           <a:xfrm>
-            <a:off x="2071270" y="2746234"/>
-            <a:ext cx="419100" cy="369332"/>
+            <a:off x="2665856" y="3264003"/>
+            <a:ext cx="4002016" cy="1077218"/>
           </a:xfrm>
           <a:prstGeom prst="rect">
             <a:avLst/>
@@ -8709,22 +8361,162 @@
           <a:noFill/>
         </p:spPr>
         <p:txBody>
-          <a:bodyPr wrap="square" lIns="91440" tIns="45720" rIns="91440" bIns="45720" rtlCol="0" anchor="t">
+          <a:bodyPr wrap="square" rtlCol="0">
             <a:spAutoFit/>
           </a:bodyPr>
           <a:lstStyle/>
           <a:p>
-            <a:pPr algn="ctr"/>
-            <a:r>
-              <a:rPr lang="en-US">
-                <a:ea typeface="+mn-lt"/>
-                <a:cs typeface="+mn-lt"/>
+            <a:r>
+              <a:rPr lang="en-US" sz="1600" b="1" dirty="0">
+                <a:solidFill>
+                  <a:schemeClr val="tx2"/>
+                </a:solidFill>
               </a:rPr>
-              <a:t>X</a:t>
-            </a:r>
-          </a:p>
-        </p:txBody>
-      </p:sp>
+              <a:t>Eliminate reverse geocoding via spatial join (</a:t>
+            </a:r>
+            <a:r>
+              <a:rPr lang="en-US" sz="1600" b="1" dirty="0" err="1">
+                <a:solidFill>
+                  <a:schemeClr val="tx2"/>
+                </a:solidFill>
+              </a:rPr>
+              <a:t>sjoin</a:t>
+            </a:r>
+            <a:r>
+              <a:rPr lang="en-US" sz="1600" b="1" dirty="0">
+                <a:solidFill>
+                  <a:schemeClr val="tx2"/>
+                </a:solidFill>
+              </a:rPr>
+              <a:t>() in </a:t>
+            </a:r>
+            <a:r>
+              <a:rPr lang="en-US" sz="1600" b="1" dirty="0" err="1">
+                <a:solidFill>
+                  <a:schemeClr val="tx2"/>
+                </a:solidFill>
+              </a:rPr>
+              <a:t>geopandas</a:t>
+            </a:r>
+            <a:r>
+              <a:rPr lang="en-US" sz="1600" b="1" dirty="0">
+                <a:solidFill>
+                  <a:schemeClr val="tx2"/>
+                </a:solidFill>
+              </a:rPr>
+              <a:t>) between agency </a:t>
+            </a:r>
+            <a:r>
+              <a:rPr lang="en-US" sz="1600" b="1" dirty="0" err="1">
+                <a:solidFill>
+                  <a:schemeClr val="tx2"/>
+                </a:solidFill>
+              </a:rPr>
+              <a:t>lat</a:t>
+            </a:r>
+            <a:r>
+              <a:rPr lang="en-US" sz="1600" b="1" dirty="0">
+                <a:solidFill>
+                  <a:schemeClr val="tx2"/>
+                </a:solidFill>
+              </a:rPr>
+              <a:t>/</a:t>
+            </a:r>
+            <a:r>
+              <a:rPr lang="en-US" sz="1600" b="1" dirty="0" err="1">
+                <a:solidFill>
+                  <a:schemeClr val="tx2"/>
+                </a:solidFill>
+              </a:rPr>
+              <a:t>lon</a:t>
+            </a:r>
+            <a:r>
+              <a:rPr lang="en-US" sz="1600" b="1" dirty="0">
+                <a:solidFill>
+                  <a:schemeClr val="tx2"/>
+                </a:solidFill>
+              </a:rPr>
+              <a:t> and </a:t>
+            </a:r>
+            <a:r>
+              <a:rPr lang="en-US" sz="1600" b="1" dirty="0" err="1">
+                <a:solidFill>
+                  <a:schemeClr val="tx2"/>
+                </a:solidFill>
+              </a:rPr>
+              <a:t>couty</a:t>
+            </a:r>
+            <a:r>
+              <a:rPr lang="en-US" sz="1600" b="1" dirty="0">
+                <a:solidFill>
+                  <a:schemeClr val="tx2"/>
+                </a:solidFill>
+              </a:rPr>
+              <a:t> polygons, then </a:t>
+            </a:r>
+            <a:r>
+              <a:rPr lang="en-US" sz="1600" b="1" dirty="0" err="1">
+                <a:solidFill>
+                  <a:schemeClr val="tx2"/>
+                </a:solidFill>
+              </a:rPr>
+              <a:t>groupby</a:t>
+            </a:r>
+            <a:r>
+              <a:rPr lang="en-US" sz="1600" b="1" dirty="0">
+                <a:solidFill>
+                  <a:schemeClr val="tx2"/>
+                </a:solidFill>
+              </a:rPr>
+              <a:t> "County".</a:t>
+            </a:r>
+          </a:p>
+        </p:txBody>
+      </p:sp>
+      <p:cxnSp>
+        <p:nvCxnSpPr>
+          <p:cNvPr id="32" name="Straight Arrow Connector 31">
+            <a:extLst>
+              <a:ext uri="{FF2B5EF4-FFF2-40B4-BE49-F238E27FC236}">
+                <a16:creationId xmlns:a16="http://schemas.microsoft.com/office/drawing/2014/main" id="{907899A9-1596-43B7-9F3B-BB774F4E8DFB}"/>
+              </a:ext>
+            </a:extLst>
+          </p:cNvPr>
+          <p:cNvCxnSpPr>
+            <a:cxnSpLocks/>
+          </p:cNvCxnSpPr>
+          <p:nvPr/>
+        </p:nvCxnSpPr>
+        <p:spPr>
+          <a:xfrm>
+            <a:off x="2126783" y="2700272"/>
+            <a:ext cx="599706" cy="539522"/>
+          </a:xfrm>
+          <a:prstGeom prst="straightConnector1">
+            <a:avLst/>
+          </a:prstGeom>
+          <a:ln w="76200">
+            <a:solidFill>
+              <a:srgbClr val="0070C0"/>
+            </a:solidFill>
+            <a:tailEnd type="triangle"/>
+          </a:ln>
+        </p:spPr>
+        <p:style>
+          <a:lnRef idx="3">
+            <a:schemeClr val="dk1"/>
+          </a:lnRef>
+          <a:fillRef idx="0">
+            <a:schemeClr val="dk1"/>
+          </a:fillRef>
+          <a:effectRef idx="2">
+            <a:schemeClr val="dk1"/>
+          </a:effectRef>
+          <a:fontRef idx="minor">
+            <a:schemeClr val="tx1"/>
+          </a:fontRef>
+        </p:style>
+      </p:cxnSp>
     </p:spTree>
     <p:extLst>
       <p:ext uri="{BB962C8B-B14F-4D97-AF65-F5344CB8AC3E}">
@@ -8738,204 +8530,7 @@
 </p:sld>
 </file>
 
-<file path=ppt/slides/slide2.xml><?xml version="1.0" encoding="utf-8"?>
-<p:sld xmlns:a="http://schemas.openxmlformats.org/drawingml/2006/main" xmlns:r="http://schemas.openxmlformats.org/officeDocument/2006/relationships" xmlns:p="http://schemas.openxmlformats.org/presentationml/2006/main">
-  <p:cSld>
-    <p:spTree>
-      <p:nvGrpSpPr>
-        <p:cNvPr id="1" name=""/>
-        <p:cNvGrpSpPr/>
-        <p:nvPr/>
-      </p:nvGrpSpPr>
-      <p:grpSpPr>
-        <a:xfrm>
-          <a:off x="0" y="0"/>
-          <a:ext cx="0" cy="0"/>
-          <a:chOff x="0" y="0"/>
-          <a:chExt cx="0" cy="0"/>
-        </a:xfrm>
-      </p:grpSpPr>
-      <p:sp>
-        <p:nvSpPr>
-          <p:cNvPr id="2" name="Title 1">
-            <a:extLst>
-              <a:ext uri="{FF2B5EF4-FFF2-40B4-BE49-F238E27FC236}">
-                <a16:creationId xmlns:a16="http://schemas.microsoft.com/office/drawing/2014/main" id="{F5E22433-D9C2-4AA0-BE1F-EAB376308C9A}"/>
-              </a:ext>
-            </a:extLst>
-          </p:cNvPr>
-          <p:cNvSpPr>
-            <a:spLocks noGrp="1"/>
-          </p:cNvSpPr>
-          <p:nvPr>
-            <p:ph type="title"/>
-          </p:nvPr>
-        </p:nvSpPr>
-        <p:spPr>
-          <a:xfrm>
-            <a:off x="900113" y="381191"/>
-            <a:ext cx="10241280" cy="714184"/>
-          </a:xfrm>
-        </p:spPr>
-        <p:txBody>
-          <a:bodyPr/>
-          <a:lstStyle/>
-          <a:p>
-            <a:r>
-              <a:rPr lang="en-US"/>
-              <a:t>Project Summary</a:t>
-            </a:r>
-          </a:p>
-        </p:txBody>
-      </p:sp>
-      <p:sp>
-        <p:nvSpPr>
-          <p:cNvPr id="3" name="Content Placeholder 2">
-            <a:extLst>
-              <a:ext uri="{FF2B5EF4-FFF2-40B4-BE49-F238E27FC236}">
-                <a16:creationId xmlns:a16="http://schemas.microsoft.com/office/drawing/2014/main" id="{730BD5E2-984D-41DA-9A19-6608C260A141}"/>
-              </a:ext>
-            </a:extLst>
-          </p:cNvPr>
-          <p:cNvSpPr>
-            <a:spLocks noGrp="1"/>
-          </p:cNvSpPr>
-          <p:nvPr>
-            <p:ph idx="1"/>
-          </p:nvPr>
-        </p:nvSpPr>
-        <p:spPr>
-          <a:xfrm>
-            <a:off x="794385" y="1352550"/>
-            <a:ext cx="10922137" cy="4654707"/>
-          </a:xfrm>
-        </p:spPr>
-        <p:txBody>
-          <a:bodyPr vert="horz" lIns="0" tIns="0" rIns="0" bIns="0" rtlCol="0" anchor="t">
-            <a:normAutofit/>
-          </a:bodyPr>
-          <a:lstStyle/>
-          <a:p>
-            <a:pPr marL="0" indent="0">
-              <a:buNone/>
-            </a:pPr>
-            <a:r>
-              <a:rPr lang="en-US" sz="2400"/>
-              <a:t>Distribution of (auto*) insurance companies, by county, in Georgia, USA relative to...</a:t>
-            </a:r>
-          </a:p>
-          <a:p>
-            <a:r>
-              <a:rPr lang="en-US" sz="2400"/>
-              <a:t>Population size (2019).</a:t>
-            </a:r>
-          </a:p>
-          <a:p>
-            <a:r>
-              <a:rPr lang="en-US" sz="2400"/>
-              <a:t>Number of car accidents (from 01-Jan-2017 through 23-Aug-2019).</a:t>
-            </a:r>
-          </a:p>
-          <a:p>
-            <a:pPr marL="0" indent="0">
-              <a:buNone/>
-            </a:pPr>
-            <a:endParaRPr lang="en-US" sz="2600"/>
-          </a:p>
-          <a:p>
-            <a:endParaRPr lang="en-US"/>
-          </a:p>
-          <a:p>
-            <a:endParaRPr lang="en-US"/>
-          </a:p>
-          <a:p>
-            <a:pPr marL="0" indent="0">
-              <a:buNone/>
-            </a:pPr>
-            <a:endParaRPr lang="en-US"/>
-          </a:p>
-          <a:p>
-            <a:pPr marL="0" indent="0">
-              <a:buNone/>
-            </a:pPr>
-            <a:endParaRPr lang="en-US"/>
-          </a:p>
-        </p:txBody>
-      </p:sp>
-      <p:pic>
-        <p:nvPicPr>
-          <p:cNvPr id="6" name="Picture 5">
-            <a:extLst>
-              <a:ext uri="{FF2B5EF4-FFF2-40B4-BE49-F238E27FC236}">
-                <a16:creationId xmlns:a16="http://schemas.microsoft.com/office/drawing/2014/main" id="{A9CBD36B-FD00-45AE-8C2E-92805EC0E0F6}"/>
-              </a:ext>
-            </a:extLst>
-          </p:cNvPr>
-          <p:cNvPicPr>
-            <a:picLocks noChangeAspect="1"/>
-          </p:cNvPicPr>
-          <p:nvPr/>
-        </p:nvPicPr>
-        <p:blipFill>
-          <a:blip r:embed="rId2"/>
-          <a:stretch>
-            <a:fillRect/>
-          </a:stretch>
-        </p:blipFill>
-        <p:spPr>
-          <a:xfrm>
-            <a:off x="1794640" y="3078041"/>
-            <a:ext cx="3113873" cy="3108960"/>
-          </a:xfrm>
-          <a:prstGeom prst="rect">
-            <a:avLst/>
-          </a:prstGeom>
-        </p:spPr>
-      </p:pic>
-      <p:pic>
-        <p:nvPicPr>
-          <p:cNvPr id="4" name="Picture 4" descr="Logo, company name&#10;&#10;Description automatically generated">
-            <a:extLst>
-              <a:ext uri="{FF2B5EF4-FFF2-40B4-BE49-F238E27FC236}">
-                <a16:creationId xmlns:a16="http://schemas.microsoft.com/office/drawing/2014/main" id="{6D0F463E-039D-4AC5-937C-0F1CD888F6E3}"/>
-              </a:ext>
-            </a:extLst>
-          </p:cNvPr>
-          <p:cNvPicPr>
-            <a:picLocks noChangeAspect="1"/>
-          </p:cNvPicPr>
-          <p:nvPr/>
-        </p:nvPicPr>
-        <p:blipFill>
-          <a:blip r:embed="rId3"/>
-          <a:stretch>
-            <a:fillRect/>
-          </a:stretch>
-        </p:blipFill>
-        <p:spPr>
-          <a:xfrm>
-            <a:off x="5846805" y="3197137"/>
-            <a:ext cx="4926226" cy="2770321"/>
-          </a:xfrm>
-          <a:prstGeom prst="rect">
-            <a:avLst/>
-          </a:prstGeom>
-        </p:spPr>
-      </p:pic>
-    </p:spTree>
-    <p:extLst>
-      <p:ext uri="{BB962C8B-B14F-4D97-AF65-F5344CB8AC3E}">
-        <p14:creationId xmlns:p14="http://schemas.microsoft.com/office/powerpoint/2010/main" val="627455011"/>
-      </p:ext>
-    </p:extLst>
-  </p:cSld>
-  <p:clrMapOvr>
-    <a:masterClrMapping/>
-  </p:clrMapOvr>
-</p:sld>
-</file>
-
-<file path=ppt/slides/slide20.xml><?xml version="1.0" encoding="utf-8"?>
+<file path=ppt/slides/slide21.xml><?xml version="1.0" encoding="utf-8"?>
 <p:sld xmlns:a="http://schemas.openxmlformats.org/drawingml/2006/main" xmlns:r="http://schemas.openxmlformats.org/officeDocument/2006/relationships" xmlns:p="http://schemas.openxmlformats.org/presentationml/2006/main">
   <p:cSld>
     <p:spTree>
@@ -9260,6 +8855,137 @@
           <a:chExt cx="0" cy="0"/>
         </a:xfrm>
       </p:grpSpPr>
+      <p:sp>
+        <p:nvSpPr>
+          <p:cNvPr id="5" name="TextBox 4">
+            <a:extLst>
+              <a:ext uri="{FF2B5EF4-FFF2-40B4-BE49-F238E27FC236}">
+                <a16:creationId xmlns:a16="http://schemas.microsoft.com/office/drawing/2014/main" id="{F4E1C481-BFDE-4FFD-9DC4-B9D628B08BB5}"/>
+              </a:ext>
+            </a:extLst>
+          </p:cNvPr>
+          <p:cNvSpPr txBox="1"/>
+          <p:nvPr/>
+        </p:nvSpPr>
+        <p:spPr>
+          <a:xfrm>
+            <a:off x="962025" y="605998"/>
+            <a:ext cx="10115550" cy="5047536"/>
+          </a:xfrm>
+          <a:prstGeom prst="rect">
+            <a:avLst/>
+          </a:prstGeom>
+          <a:noFill/>
+        </p:spPr>
+        <p:txBody>
+          <a:bodyPr wrap="square" lIns="91440" tIns="45720" rIns="91440" bIns="45720" anchor="t">
+            <a:spAutoFit/>
+          </a:bodyPr>
+          <a:lstStyle/>
+          <a:p>
+            <a:pPr marL="0" indent="0">
+              <a:buNone/>
+            </a:pPr>
+            <a:r>
+              <a:rPr lang="en-US" sz="3600"/>
+              <a:t>Questions?</a:t>
+            </a:r>
+          </a:p>
+          <a:p>
+            <a:pPr marL="0" indent="0">
+              <a:buNone/>
+            </a:pPr>
+            <a:endParaRPr lang="en-US" sz="2600"/>
+          </a:p>
+          <a:p>
+            <a:pPr marL="457200" indent="-457200">
+              <a:buFont typeface="Arial" panose="020B0604020202020204" pitchFamily="34" charset="0"/>
+              <a:buChar char="•"/>
+            </a:pPr>
+            <a:r>
+              <a:rPr lang="en-US" sz="2600"/>
+              <a:t>How are insurance companies distributed in the state? Which are most common?</a:t>
+            </a:r>
+          </a:p>
+          <a:p>
+            <a:endParaRPr lang="en-US" sz="2600"/>
+          </a:p>
+          <a:p>
+            <a:pPr marL="457200" indent="-457200">
+              <a:buFont typeface="Arial" panose="020B0604020202020204" pitchFamily="34" charset="0"/>
+              <a:buChar char="•"/>
+            </a:pPr>
+            <a:r>
+              <a:rPr lang="en-US" sz="2600"/>
+              <a:t>Which counties have higher than expected rates of insurance companies?</a:t>
+            </a:r>
+          </a:p>
+          <a:p>
+            <a:pPr marL="914400" lvl="1" indent="-457200">
+              <a:buFont typeface="Arial" panose="020B0604020202020204" pitchFamily="34" charset="0"/>
+              <a:buChar char="•"/>
+            </a:pPr>
+            <a:r>
+              <a:rPr lang="en-US" sz="2600"/>
+              <a:t>relative to population size</a:t>
+            </a:r>
+          </a:p>
+          <a:p>
+            <a:pPr marL="914400" lvl="1" indent="-457200">
+              <a:buFont typeface="Arial" panose="020B0604020202020204" pitchFamily="34" charset="0"/>
+              <a:buChar char="•"/>
+            </a:pPr>
+            <a:r>
+              <a:rPr lang="en-US" sz="2600"/>
+              <a:t>relative to accident counts</a:t>
+            </a:r>
+          </a:p>
+          <a:p>
+            <a:pPr lvl="1"/>
+            <a:endParaRPr lang="en-US" sz="2600"/>
+          </a:p>
+          <a:p>
+            <a:pPr marL="457200" indent="-457200">
+              <a:buFont typeface="Arial" panose="020B0604020202020204" pitchFamily="34" charset="0"/>
+              <a:buChar char="•"/>
+            </a:pPr>
+            <a:r>
+              <a:rPr lang="en-US" sz="2600"/>
+              <a:t>Does population size or frequency of accidents affect where offices are located?</a:t>
+            </a:r>
+          </a:p>
+        </p:txBody>
+      </p:sp>
+    </p:spTree>
+    <p:extLst>
+      <p:ext uri="{BB962C8B-B14F-4D97-AF65-F5344CB8AC3E}">
+        <p14:creationId xmlns:p14="http://schemas.microsoft.com/office/powerpoint/2010/main" val="1029681935"/>
+      </p:ext>
+    </p:extLst>
+  </p:cSld>
+  <p:clrMapOvr>
+    <a:masterClrMapping/>
+  </p:clrMapOvr>
+</p:sld>
+</file>
+
+<file path=ppt/slides/slide5.xml><?xml version="1.0" encoding="utf-8"?>
+<p:sld xmlns:a="http://schemas.openxmlformats.org/drawingml/2006/main" xmlns:r="http://schemas.openxmlformats.org/officeDocument/2006/relationships" xmlns:p="http://schemas.openxmlformats.org/presentationml/2006/main">
+  <p:cSld>
+    <p:spTree>
+      <p:nvGrpSpPr>
+        <p:cNvPr id="1" name=""/>
+        <p:cNvGrpSpPr/>
+        <p:nvPr/>
+      </p:nvGrpSpPr>
+      <p:grpSpPr>
+        <a:xfrm>
+          <a:off x="0" y="0"/>
+          <a:ext cx="0" cy="0"/>
+          <a:chOff x="0" y="0"/>
+          <a:chExt cx="0" cy="0"/>
+        </a:xfrm>
+      </p:grpSpPr>
       <p:pic>
         <p:nvPicPr>
           <p:cNvPr id="12" name="Picture 11" descr="Map&#10;&#10;Description automatically generated">
@@ -9348,14 +9074,14 @@
           <a:noFill/>
         </p:spPr>
         <p:txBody>
-          <a:bodyPr wrap="square" lIns="91440" tIns="45720" rIns="91440" bIns="45720" rtlCol="0" anchor="t">
+          <a:bodyPr wrap="square" rtlCol="0">
             <a:spAutoFit/>
           </a:bodyPr>
           <a:lstStyle/>
           <a:p>
             <a:r>
               <a:rPr lang="en-US" b="1"/>
-              <a:t>US Census Bureau 2019</a:t>
+              <a:t>US Census Burrow 2019</a:t>
             </a:r>
           </a:p>
           <a:p>
@@ -10063,422 +9789,6 @@
 </p:sld>
 </file>
 
-<file path=ppt/slides/slide5.xml><?xml version="1.0" encoding="utf-8"?>
-<p:sld xmlns:a="http://schemas.openxmlformats.org/drawingml/2006/main" xmlns:r="http://schemas.openxmlformats.org/officeDocument/2006/relationships" xmlns:p="http://schemas.openxmlformats.org/presentationml/2006/main">
-  <p:cSld>
-    <p:spTree>
-      <p:nvGrpSpPr>
-        <p:cNvPr id="1" name=""/>
-        <p:cNvGrpSpPr/>
-        <p:nvPr/>
-      </p:nvGrpSpPr>
-      <p:grpSpPr>
-        <a:xfrm>
-          <a:off x="0" y="0"/>
-          <a:ext cx="0" cy="0"/>
-          <a:chOff x="0" y="0"/>
-          <a:chExt cx="0" cy="0"/>
-        </a:xfrm>
-      </p:grpSpPr>
-      <p:sp>
-        <p:nvSpPr>
-          <p:cNvPr id="2" name="Title 1">
-            <a:extLst>
-              <a:ext uri="{FF2B5EF4-FFF2-40B4-BE49-F238E27FC236}">
-                <a16:creationId xmlns:a16="http://schemas.microsoft.com/office/drawing/2014/main" id="{447F379F-4F12-44EA-943E-35A946452EBB}"/>
-              </a:ext>
-            </a:extLst>
-          </p:cNvPr>
-          <p:cNvSpPr>
-            <a:spLocks noGrp="1"/>
-          </p:cNvSpPr>
-          <p:nvPr>
-            <p:ph type="title"/>
-          </p:nvPr>
-        </p:nvSpPr>
-        <p:spPr>
-          <a:xfrm>
-            <a:off x="246744" y="415097"/>
-            <a:ext cx="3825290" cy="1531861"/>
-          </a:xfrm>
-        </p:spPr>
-        <p:txBody>
-          <a:bodyPr>
-            <a:normAutofit fontScale="90000"/>
-          </a:bodyPr>
-          <a:lstStyle/>
-          <a:p>
-            <a:r>
-              <a:rPr lang="en-US">
-                <a:solidFill>
-                  <a:schemeClr val="accent3"/>
-                </a:solidFill>
-              </a:rPr>
-              <a:t>Insurance</a:t>
-            </a:r>
-            <a:r>
-              <a:rPr lang="en-US"/>
-              <a:t> Data Cleanup &amp; Exploration</a:t>
-            </a:r>
-          </a:p>
-        </p:txBody>
-      </p:sp>
-      <p:sp>
-        <p:nvSpPr>
-          <p:cNvPr id="4" name="Text Placeholder 3">
-            <a:extLst>
-              <a:ext uri="{FF2B5EF4-FFF2-40B4-BE49-F238E27FC236}">
-                <a16:creationId xmlns:a16="http://schemas.microsoft.com/office/drawing/2014/main" id="{F3E265D7-D117-4B81-AA02-DB5EE30D3ABC}"/>
-              </a:ext>
-            </a:extLst>
-          </p:cNvPr>
-          <p:cNvSpPr>
-            <a:spLocks noGrp="1"/>
-          </p:cNvSpPr>
-          <p:nvPr>
-            <p:ph type="body" sz="half" idx="2"/>
-          </p:nvPr>
-        </p:nvSpPr>
-        <p:spPr>
-          <a:xfrm>
-            <a:off x="5583645" y="-2089"/>
-            <a:ext cx="6498564" cy="6817951"/>
-          </a:xfrm>
-        </p:spPr>
-        <p:txBody>
-          <a:bodyPr vert="horz" lIns="0" tIns="0" rIns="0" bIns="0" rtlCol="0" anchor="t">
-            <a:noAutofit/>
-          </a:bodyPr>
-          <a:lstStyle/>
-          <a:p>
-            <a:pPr marL="285750" indent="-285750">
-              <a:buFont typeface="Wingdings" panose="020B0604020202020204" pitchFamily="34" charset="0"/>
-              <a:buChar char="Ø"/>
-            </a:pPr>
-            <a:r>
-              <a:rPr lang="en-US" sz="1400" b="1"/>
-              <a:t>Places API Search – 50k Radius</a:t>
-            </a:r>
-          </a:p>
-          <a:p>
-            <a:pPr marL="742950" lvl="1">
-              <a:buChar char="•"/>
-            </a:pPr>
-            <a:r>
-              <a:rPr lang="en-US" sz="1100"/>
-              <a:t>   30k+ outputs of insurance agencies</a:t>
-            </a:r>
-          </a:p>
-          <a:p>
-            <a:pPr marL="1371600" lvl="2" indent="-171450">
-              <a:buFont typeface="Courier New" panose="020B0604020202020204" pitchFamily="34" charset="0"/>
-              <a:buChar char="o"/>
-            </a:pPr>
-            <a:r>
-              <a:rPr lang="en-US" sz="1100"/>
-              <a:t>Multiple duplicate agencies </a:t>
-            </a:r>
-          </a:p>
-          <a:p>
-            <a:pPr marL="1828800" lvl="3" indent="-171450">
-              <a:buFont typeface="Courier New" panose="020B0604020202020204" pitchFamily="34" charset="0"/>
-              <a:buChar char="o"/>
-            </a:pPr>
-            <a:r>
-              <a:rPr lang="en-US" sz="1100">
-                <a:ea typeface="+mn-lt"/>
-                <a:cs typeface="+mn-lt"/>
-              </a:rPr>
-              <a:t>Solved by dropping duplicates through pandas (had to dropout the target coordinates)</a:t>
-            </a:r>
-            <a:endParaRPr lang="en-US" sz="1100"/>
-          </a:p>
-          <a:p>
-            <a:pPr marL="1371600" lvl="2" indent="-171450">
-              <a:buFont typeface="Courier New" panose="020B0604020202020204" pitchFamily="34" charset="0"/>
-              <a:buChar char="o"/>
-            </a:pPr>
-            <a:r>
-              <a:rPr lang="en-US" sz="1100"/>
-              <a:t>Non-Auto Agencies</a:t>
-            </a:r>
-          </a:p>
-          <a:p>
-            <a:pPr marL="1828800" lvl="3" indent="-171450">
-              <a:buFont typeface="Courier New" panose="020B0604020202020204" pitchFamily="34" charset="0"/>
-              <a:buChar char="o"/>
-            </a:pPr>
-            <a:r>
-              <a:rPr lang="en-US" sz="1100"/>
-              <a:t>Used a keyword search utilizing "str.contains" funtion for the non-auto agencies (BB&amp;T, Suntrust, etc) and dropped them from our dataframe.</a:t>
-            </a:r>
-          </a:p>
-          <a:p>
-            <a:pPr marL="1371600" lvl="2" indent="-171450">
-              <a:buFont typeface="Courier New" panose="020B0604020202020204" pitchFamily="34" charset="0"/>
-              <a:buChar char="o"/>
-            </a:pPr>
-            <a:r>
-              <a:rPr lang="en-US" sz="1100"/>
-              <a:t>Insurance agencies had different names for the same agency. (i.e Derek Hutcheson – State Farm Insurance Agent) </a:t>
-            </a:r>
-          </a:p>
-          <a:p>
-            <a:pPr marL="1828800" lvl="3" indent="-171450">
-              <a:buFont typeface="Courier New" panose="020B0604020202020204" pitchFamily="34" charset="0"/>
-              <a:buChar char="o"/>
-            </a:pPr>
-            <a:r>
-              <a:rPr lang="en-US" sz="1100"/>
-              <a:t>Solved this issue by copying our lists of agencies under the "agency_name" column into another column called "agency_simple." This was to keep the original name of the insurance agency.</a:t>
-            </a:r>
-          </a:p>
-          <a:p>
-            <a:pPr marL="1828800" lvl="3" indent="-171450">
-              <a:buFont typeface="Courier New" panose="020B0604020202020204" pitchFamily="34" charset="0"/>
-              <a:buChar char="o"/>
-            </a:pPr>
-            <a:r>
-              <a:rPr lang="en-US" sz="1100"/>
-              <a:t>With the our new "agency_simple" column we were then able to use the str.contains function to search all the agencies under the same company.</a:t>
-            </a:r>
-          </a:p>
-          <a:p>
-            <a:pPr marL="1828800" lvl="3" indent="-171450">
-              <a:buFont typeface="Courier New" panose="020B0604020202020204" pitchFamily="34" charset="0"/>
-              <a:buChar char="o"/>
-            </a:pPr>
-            <a:r>
-              <a:rPr lang="en-US" sz="1100"/>
-              <a:t>We then replaced the name of the agency under the "agency_simple" column to make all the names similar under one company.  This was to make sorting and merging data simpler.  </a:t>
-            </a:r>
-          </a:p>
-          <a:p>
-            <a:pPr marL="457200" indent="-171450">
-              <a:buFont typeface="Wingdings" panose="020B0604020202020204" pitchFamily="34" charset="0"/>
-              <a:buChar char="Ø"/>
-            </a:pPr>
-            <a:r>
-              <a:rPr lang="en-US" sz="1400" b="1"/>
-              <a:t>Search did not separate by county</a:t>
-            </a:r>
-          </a:p>
-          <a:p>
-            <a:pPr marL="914400" lvl="1" indent="-285750">
-              <a:buFont typeface="Arial" panose="020B0604020202020204" pitchFamily="34" charset="0"/>
-              <a:buChar char="•"/>
-            </a:pPr>
-            <a:r>
-              <a:rPr lang="en-US" sz="1100"/>
-              <a:t>Had to clean data to identify specific counties by reverse geocoding</a:t>
-            </a:r>
-          </a:p>
-          <a:p>
-            <a:pPr marL="914400" lvl="1" indent="-285750">
-              <a:buFont typeface="Arial" panose="020B0604020202020204" pitchFamily="34" charset="0"/>
-              <a:buChar char="•"/>
-            </a:pPr>
-            <a:r>
-              <a:rPr lang="en-US" sz="1100"/>
-              <a:t>Able</a:t>
-            </a:r>
-            <a:r>
-              <a:rPr lang="en-US" sz="1100">
-                <a:ea typeface="+mn-lt"/>
-                <a:cs typeface="+mn-lt"/>
-              </a:rPr>
-              <a:t> to use reverse geocoding by using latitude/longitude to separate each location by state/county</a:t>
-            </a:r>
-            <a:endParaRPr lang="en-US" sz="1100"/>
-          </a:p>
-          <a:p>
-            <a:pPr marL="457200" indent="-171450">
-              <a:buFont typeface="Wingdings" panose="020B0604020202020204" pitchFamily="34" charset="0"/>
-              <a:buChar char="Ø"/>
-            </a:pPr>
-            <a:r>
-              <a:rPr lang="en-US" sz="1400" b="1">
-                <a:ea typeface="+mn-lt"/>
-                <a:cs typeface="+mn-lt"/>
-              </a:rPr>
-              <a:t>Outputs out of state borders</a:t>
-            </a:r>
-          </a:p>
-          <a:p>
-            <a:pPr marL="914400" lvl="1" indent="-285750">
-              <a:buFont typeface="Arial" panose="020B0604020202020204" pitchFamily="34" charset="0"/>
-              <a:buChar char="•"/>
-            </a:pPr>
-            <a:r>
-              <a:rPr lang="en-US" sz="1100">
-                <a:ea typeface="+mn-lt"/>
-                <a:cs typeface="+mn-lt"/>
-              </a:rPr>
-              <a:t>Continued</a:t>
-            </a:r>
-            <a:r>
-              <a:rPr lang="en-US" sz="1100"/>
-              <a:t> utilizing reverse geocoding to identify each locations state</a:t>
-            </a:r>
-            <a:endParaRPr lang="en-US" sz="1100" b="1"/>
-          </a:p>
-          <a:p>
-            <a:pPr marL="1543050" lvl="2" indent="-171450">
-              <a:buFont typeface="Courier New" panose="020B0604020202020204" pitchFamily="34" charset="0"/>
-              <a:buChar char="o"/>
-            </a:pPr>
-            <a:r>
-              <a:rPr lang="en-US" sz="1100"/>
-              <a:t>Dropped all locations that were not in GA</a:t>
-            </a:r>
-            <a:endParaRPr lang="en-US" sz="1100" b="1"/>
-          </a:p>
-          <a:p>
-            <a:pPr marL="1200150" lvl="2">
-              <a:buChar char="•"/>
-            </a:pPr>
-            <a:endParaRPr lang="en-US"/>
-          </a:p>
-          <a:p>
-            <a:pPr marL="742950" lvl="1">
-              <a:buChar char="•"/>
-            </a:pPr>
-            <a:endParaRPr lang="en-US"/>
-          </a:p>
-          <a:p>
-            <a:pPr marL="742950" lvl="1">
-              <a:buChar char="•"/>
-            </a:pPr>
-            <a:endParaRPr lang="en-US"/>
-          </a:p>
-          <a:p>
-            <a:pPr marL="1200150" lvl="2">
-              <a:buChar char="•"/>
-            </a:pPr>
-            <a:endParaRPr lang="en-US"/>
-          </a:p>
-          <a:p>
-            <a:pPr marL="1200150" lvl="2">
-              <a:buChar char="•"/>
-            </a:pPr>
-            <a:endParaRPr lang="en-US"/>
-          </a:p>
-          <a:p>
-            <a:pPr marL="1200150" lvl="2">
-              <a:buChar char="•"/>
-            </a:pPr>
-            <a:endParaRPr lang="en-US"/>
-          </a:p>
-          <a:p>
-            <a:pPr marL="742950" lvl="1">
-              <a:buChar char="•"/>
-            </a:pPr>
-            <a:endParaRPr lang="en-US"/>
-          </a:p>
-        </p:txBody>
-      </p:sp>
-      <p:pic>
-        <p:nvPicPr>
-          <p:cNvPr id="15" name="Picture 15">
-            <a:extLst>
-              <a:ext uri="{FF2B5EF4-FFF2-40B4-BE49-F238E27FC236}">
-                <a16:creationId xmlns:a16="http://schemas.microsoft.com/office/drawing/2014/main" id="{30DE5DDE-ADC0-43AD-B5BC-C33B45D417CD}"/>
-              </a:ext>
-            </a:extLst>
-          </p:cNvPr>
-          <p:cNvPicPr>
-            <a:picLocks noChangeAspect="1"/>
-          </p:cNvPicPr>
-          <p:nvPr/>
-        </p:nvPicPr>
-        <p:blipFill>
-          <a:blip r:embed="rId2"/>
-          <a:stretch>
-            <a:fillRect/>
-          </a:stretch>
-        </p:blipFill>
-        <p:spPr>
-          <a:xfrm>
-            <a:off x="245326" y="1951216"/>
-            <a:ext cx="5177883" cy="1859032"/>
-          </a:xfrm>
-          <a:prstGeom prst="rect">
-            <a:avLst/>
-          </a:prstGeom>
-        </p:spPr>
-      </p:pic>
-      <p:pic>
-        <p:nvPicPr>
-          <p:cNvPr id="16" name="Picture 16" descr="Text&#10;&#10;Description automatically generated">
-            <a:extLst>
-              <a:ext uri="{FF2B5EF4-FFF2-40B4-BE49-F238E27FC236}">
-                <a16:creationId xmlns:a16="http://schemas.microsoft.com/office/drawing/2014/main" id="{A8B552C1-96B5-4229-909E-CA09C2357121}"/>
-              </a:ext>
-            </a:extLst>
-          </p:cNvPr>
-          <p:cNvPicPr>
-            <a:picLocks noChangeAspect="1"/>
-          </p:cNvPicPr>
-          <p:nvPr/>
-        </p:nvPicPr>
-        <p:blipFill rotWithShape="1">
-          <a:blip r:embed="rId3"/>
-          <a:srcRect l="4657" t="532" r="3602" b="1389"/>
-          <a:stretch/>
-        </p:blipFill>
-        <p:spPr>
-          <a:xfrm>
-            <a:off x="246744" y="3809753"/>
-            <a:ext cx="5184845" cy="663870"/>
-          </a:xfrm>
-          <a:prstGeom prst="rect">
-            <a:avLst/>
-          </a:prstGeom>
-        </p:spPr>
-      </p:pic>
-      <p:pic>
-        <p:nvPicPr>
-          <p:cNvPr id="17" name="Picture 17">
-            <a:extLst>
-              <a:ext uri="{FF2B5EF4-FFF2-40B4-BE49-F238E27FC236}">
-                <a16:creationId xmlns:a16="http://schemas.microsoft.com/office/drawing/2014/main" id="{C94A4894-8674-4C0C-AAE1-F54B71E3D62A}"/>
-              </a:ext>
-            </a:extLst>
-          </p:cNvPr>
-          <p:cNvPicPr>
-            <a:picLocks noChangeAspect="1"/>
-          </p:cNvPicPr>
-          <p:nvPr/>
-        </p:nvPicPr>
-        <p:blipFill>
-          <a:blip r:embed="rId4"/>
-          <a:stretch>
-            <a:fillRect/>
-          </a:stretch>
-        </p:blipFill>
-        <p:spPr>
-          <a:xfrm>
-            <a:off x="245327" y="4466474"/>
-            <a:ext cx="5177882" cy="1772221"/>
-          </a:xfrm>
-          <a:prstGeom prst="rect">
-            <a:avLst/>
-          </a:prstGeom>
-        </p:spPr>
-      </p:pic>
-    </p:spTree>
-    <p:extLst>
-      <p:ext uri="{BB962C8B-B14F-4D97-AF65-F5344CB8AC3E}">
-        <p14:creationId xmlns:p14="http://schemas.microsoft.com/office/powerpoint/2010/main" val="2416058596"/>
-      </p:ext>
-    </p:extLst>
-  </p:cSld>
-  <p:clrMapOvr>
-    <a:masterClrMapping/>
-  </p:clrMapOvr>
-</p:sld>
-</file>
-
 <file path=ppt/slides/slide6.xml><?xml version="1.0" encoding="utf-8"?>
 <p:sld xmlns:a="http://schemas.openxmlformats.org/drawingml/2006/main" xmlns:r="http://schemas.openxmlformats.org/officeDocument/2006/relationships" xmlns:p="http://schemas.openxmlformats.org/presentationml/2006/main">
   <p:cSld>
@@ -10501,7 +9811,7 @@
           <p:cNvPr id="2" name="Title 1">
             <a:extLst>
               <a:ext uri="{FF2B5EF4-FFF2-40B4-BE49-F238E27FC236}">
-                <a16:creationId xmlns:a16="http://schemas.microsoft.com/office/drawing/2014/main" id="{37FD448B-5E1D-4138-A9D0-C1AFBF0851DA}"/>
+                <a16:creationId xmlns:a16="http://schemas.microsoft.com/office/drawing/2014/main" id="{447F379F-4F12-44EA-943E-35A946452EBB}"/>
               </a:ext>
             </a:extLst>
           </p:cNvPr>
@@ -10514,37 +9824,28 @@
         </p:nvSpPr>
         <p:spPr>
           <a:xfrm>
-            <a:off x="435811" y="225553"/>
-            <a:ext cx="4680868" cy="2079964"/>
+            <a:off x="246744" y="415097"/>
+            <a:ext cx="3825290" cy="1531861"/>
           </a:xfrm>
         </p:spPr>
         <p:txBody>
           <a:bodyPr>
-            <a:normAutofit/>
+            <a:normAutofit fontScale="90000"/>
           </a:bodyPr>
           <a:lstStyle/>
           <a:p>
             <a:r>
               <a:rPr lang="en-US">
                 <a:solidFill>
-                  <a:schemeClr val="accent1">
-                    <a:lumMod val="75000"/>
-                  </a:schemeClr>
+                  <a:schemeClr val="accent3"/>
                 </a:solidFill>
               </a:rPr>
-              <a:t>Accident</a:t>
-            </a:r>
-            <a:br>
-              <a:rPr lang="en-US"/>
-            </a:br>
-            <a:r>
-              <a:rPr lang="en-US">
-                <a:ea typeface="+mj-lt"/>
-                <a:cs typeface="+mj-lt"/>
-              </a:rPr>
-              <a:t>DATA CLEANUP &amp; EXPLORATION</a:t>
-            </a:r>
-            <a:endParaRPr lang="en-US"/>
+              <a:t>Insurance</a:t>
+            </a:r>
+            <a:r>
+              <a:rPr lang="en-US"/>
+              <a:t> Data Cleanup &amp; Exploration</a:t>
+            </a:r>
           </a:p>
         </p:txBody>
       </p:sp>
@@ -10553,7 +9854,7 @@
           <p:cNvPr id="4" name="Text Placeholder 3">
             <a:extLst>
               <a:ext uri="{FF2B5EF4-FFF2-40B4-BE49-F238E27FC236}">
-                <a16:creationId xmlns:a16="http://schemas.microsoft.com/office/drawing/2014/main" id="{4FA50C27-35FE-4534-B806-28A9AC89F3FF}"/>
+                <a16:creationId xmlns:a16="http://schemas.microsoft.com/office/drawing/2014/main" id="{F3E265D7-D117-4B81-AA02-DB5EE30D3ABC}"/>
               </a:ext>
             </a:extLst>
           </p:cNvPr>
@@ -10566,13 +9867,13 @@
         </p:nvSpPr>
         <p:spPr>
           <a:xfrm>
-            <a:off x="342232" y="2672339"/>
-            <a:ext cx="5322552" cy="3343702"/>
+            <a:off x="5583645" y="-2089"/>
+            <a:ext cx="6498564" cy="6817951"/>
           </a:xfrm>
         </p:spPr>
         <p:txBody>
           <a:bodyPr vert="horz" lIns="0" tIns="0" rIns="0" bIns="0" rtlCol="0" anchor="t">
-            <a:normAutofit/>
+            <a:noAutofit/>
           </a:bodyPr>
           <a:lstStyle/>
           <a:p>
@@ -10581,38 +9882,17 @@
               <a:buChar char="Ø"/>
             </a:pPr>
             <a:r>
-              <a:rPr lang="en-US" b="1"/>
-              <a:t>Multiple County Iterations</a:t>
-            </a:r>
-          </a:p>
-          <a:p>
-            <a:pPr marL="742950" lvl="1" indent="-285750">
-              <a:buFont typeface="Wingdings" panose="020B0604020202020204" pitchFamily="34" charset="0"/>
-              <a:buChar char="§"/>
+              <a:rPr lang="en-US" sz="1400" b="1"/>
+              <a:t>Places API Search – 50k Radius</a:t>
+            </a:r>
+          </a:p>
+          <a:p>
+            <a:pPr marL="742950" lvl="1">
+              <a:buChar char="•"/>
             </a:pPr>
             <a:r>
-              <a:rPr lang="en-US"/>
-              <a:t>Macon vs Macon-Bibb</a:t>
-            </a:r>
-          </a:p>
-          <a:p>
-            <a:pPr marL="285750" indent="-171450">
-              <a:buFont typeface="Wingdings" panose="020B0604020202020204" pitchFamily="34" charset="0"/>
-              <a:buChar char="Ø"/>
-            </a:pPr>
-            <a:r>
-              <a:rPr lang="en-US" b="1"/>
-              <a:t>County Spelling</a:t>
-            </a:r>
-          </a:p>
-          <a:p>
-            <a:pPr marL="742950" lvl="1" indent="-285750">
-              <a:buFont typeface="Wingdings" panose="020B0604020202020204" pitchFamily="34" charset="0"/>
-              <a:buChar char="§"/>
-            </a:pPr>
-            <a:r>
-              <a:rPr lang="en-US"/>
-              <a:t>County names were showing different case distinctions</a:t>
+              <a:rPr lang="en-US" sz="1100"/>
+              <a:t>   30k+ outputs of insurance agencies</a:t>
             </a:r>
           </a:p>
           <a:p>
@@ -10621,9 +9901,23 @@
               <a:buChar char="o"/>
             </a:pPr>
             <a:r>
-              <a:rPr lang="en-US"/>
-              <a:t>DeKalb vs Dekalb </a:t>
-            </a:r>
+              <a:rPr lang="en-US" sz="1100"/>
+              <a:t>Multiple duplicate agencies </a:t>
+            </a:r>
+          </a:p>
+          <a:p>
+            <a:pPr marL="1828800" lvl="3" indent="-171450">
+              <a:buFont typeface="Courier New" panose="020B0604020202020204" pitchFamily="34" charset="0"/>
+              <a:buChar char="o"/>
+            </a:pPr>
+            <a:r>
+              <a:rPr lang="en-US" sz="1100">
+                <a:ea typeface="+mn-lt"/>
+                <a:cs typeface="+mn-lt"/>
+              </a:rPr>
+              <a:t>Solved by dropping duplicates through pandas (had to dropout the target coordinates)</a:t>
+            </a:r>
+            <a:endParaRPr lang="en-US" sz="1100"/>
           </a:p>
           <a:p>
             <a:pPr marL="1371600" lvl="2" indent="-171450">
@@ -10631,8 +9925,18 @@
               <a:buChar char="o"/>
             </a:pPr>
             <a:r>
-              <a:rPr lang="en-US"/>
-              <a:t>McDuffie vs Mcduffie  </a:t>
+              <a:rPr lang="en-US" sz="1100"/>
+              <a:t>Non-Auto Agencies</a:t>
+            </a:r>
+          </a:p>
+          <a:p>
+            <a:pPr marL="1828800" lvl="3" indent="-171450">
+              <a:buFont typeface="Courier New" panose="020B0604020202020204" pitchFamily="34" charset="0"/>
+              <a:buChar char="o"/>
+            </a:pPr>
+            <a:r>
+              <a:rPr lang="en-US" sz="1100"/>
+              <a:t>Used a keyword search utilizing "str.contains" funtion for the non-auto agencies (BB&amp;T, Suntrust, etc) and dropped them from our dataframe.</a:t>
             </a:r>
           </a:p>
           <a:p>
@@ -10641,28 +9945,170 @@
               <a:buChar char="o"/>
             </a:pPr>
             <a:r>
-              <a:rPr lang="en-US"/>
-              <a:t>McIntosh vs Mcintosh </a:t>
+              <a:rPr lang="en-US" sz="1100"/>
+              <a:t>Insurance agencies had different names for the same agency. (i.e Derek Hutcheson – State Farm Insurance Agent) </a:t>
+            </a:r>
+          </a:p>
+          <a:p>
+            <a:pPr marL="1828800" lvl="3" indent="-171450">
+              <a:buFont typeface="Courier New" panose="020B0604020202020204" pitchFamily="34" charset="0"/>
+              <a:buChar char="o"/>
+            </a:pPr>
+            <a:r>
+              <a:rPr lang="en-US" sz="1100"/>
+              <a:t>Solved this issue by copying our lists of agencies under the "agency_name" column into another column called "agency_simple." This was to keep the original name of the insurance agency.</a:t>
+            </a:r>
+          </a:p>
+          <a:p>
+            <a:pPr marL="1828800" lvl="3" indent="-171450">
+              <a:buFont typeface="Courier New" panose="020B0604020202020204" pitchFamily="34" charset="0"/>
+              <a:buChar char="o"/>
+            </a:pPr>
+            <a:r>
+              <a:rPr lang="en-US" sz="1100"/>
+              <a:t>With the our new "agency_simple" column we were then able to use the str.contains function to search all the agencies under the same company.</a:t>
+            </a:r>
+          </a:p>
+          <a:p>
+            <a:pPr marL="1828800" lvl="3" indent="-171450">
+              <a:buFont typeface="Courier New" panose="020B0604020202020204" pitchFamily="34" charset="0"/>
+              <a:buChar char="o"/>
+            </a:pPr>
+            <a:r>
+              <a:rPr lang="en-US" sz="1100"/>
+              <a:t>We then replaced the name of the agency under the "agency_simple" column to make all the names similar under one company.  This was to make sorting and merging data simpler.  </a:t>
+            </a:r>
+          </a:p>
+          <a:p>
+            <a:pPr marL="457200" indent="-171450">
+              <a:buFont typeface="Wingdings" panose="020B0604020202020204" pitchFamily="34" charset="0"/>
+              <a:buChar char="Ø"/>
+            </a:pPr>
+            <a:r>
+              <a:rPr lang="en-US" sz="1400" b="1"/>
+              <a:t>Search did not separate by county</a:t>
             </a:r>
           </a:p>
           <a:p>
             <a:pPr marL="914400" lvl="1" indent="-285750">
+              <a:buFont typeface="Arial" panose="020B0604020202020204" pitchFamily="34" charset="0"/>
+              <a:buChar char="•"/>
+            </a:pPr>
+            <a:r>
+              <a:rPr lang="en-US" sz="1100"/>
+              <a:t>Had to clean data to identify specific counties by reverse geocoding</a:t>
+            </a:r>
+          </a:p>
+          <a:p>
+            <a:pPr marL="914400" lvl="1" indent="-285750">
+              <a:buFont typeface="Arial" panose="020B0604020202020204" pitchFamily="34" charset="0"/>
+              <a:buChar char="•"/>
+            </a:pPr>
+            <a:r>
+              <a:rPr lang="en-US" sz="1100"/>
+              <a:t>Able</a:t>
+            </a:r>
+            <a:r>
+              <a:rPr lang="en-US" sz="1100">
+                <a:ea typeface="+mn-lt"/>
+                <a:cs typeface="+mn-lt"/>
+              </a:rPr>
+              <a:t> to use reverse geocoding by using latitude/longitude to separate each location by state/county</a:t>
+            </a:r>
+            <a:endParaRPr lang="en-US" sz="1100"/>
+          </a:p>
+          <a:p>
+            <a:pPr marL="457200" indent="-171450">
               <a:buFont typeface="Wingdings" panose="020B0604020202020204" pitchFamily="34" charset="0"/>
-              <a:buChar char="v"/>
+              <a:buChar char="Ø"/>
             </a:pPr>
             <a:r>
-              <a:rPr lang="en-US" b="1"/>
-              <a:t>Resulting in county count being incorrect (163 vs 159)</a:t>
-            </a:r>
+              <a:rPr lang="en-US" sz="1400" b="1">
+                <a:ea typeface="+mn-lt"/>
+                <a:cs typeface="+mn-lt"/>
+              </a:rPr>
+              <a:t>Outputs out of state borders</a:t>
+            </a:r>
+          </a:p>
+          <a:p>
+            <a:pPr marL="914400" lvl="1" indent="-285750">
+              <a:buFont typeface="Arial" panose="020B0604020202020204" pitchFamily="34" charset="0"/>
+              <a:buChar char="•"/>
+            </a:pPr>
+            <a:r>
+              <a:rPr lang="en-US" sz="1100">
+                <a:ea typeface="+mn-lt"/>
+                <a:cs typeface="+mn-lt"/>
+              </a:rPr>
+              <a:t>Continued</a:t>
+            </a:r>
+            <a:r>
+              <a:rPr lang="en-US" sz="1100"/>
+              <a:t> utilizing reverse geocoding to identify each locations state</a:t>
+            </a:r>
+            <a:endParaRPr lang="en-US" sz="1100" b="1"/>
+          </a:p>
+          <a:p>
+            <a:pPr marL="1543050" lvl="2" indent="-171450">
+              <a:buFont typeface="Courier New" panose="020B0604020202020204" pitchFamily="34" charset="0"/>
+              <a:buChar char="o"/>
+            </a:pPr>
+            <a:r>
+              <a:rPr lang="en-US" sz="1100"/>
+              <a:t>Dropped all locations that were not in GA</a:t>
+            </a:r>
+            <a:endParaRPr lang="en-US" sz="1100" b="1"/>
+          </a:p>
+          <a:p>
+            <a:pPr marL="1200150" lvl="2">
+              <a:buChar char="•"/>
+            </a:pPr>
+            <a:endParaRPr lang="en-US"/>
+          </a:p>
+          <a:p>
+            <a:pPr marL="742950" lvl="1">
+              <a:buChar char="•"/>
+            </a:pPr>
+            <a:endParaRPr lang="en-US"/>
+          </a:p>
+          <a:p>
+            <a:pPr marL="742950" lvl="1">
+              <a:buChar char="•"/>
+            </a:pPr>
+            <a:endParaRPr lang="en-US"/>
+          </a:p>
+          <a:p>
+            <a:pPr marL="1200150" lvl="2">
+              <a:buChar char="•"/>
+            </a:pPr>
+            <a:endParaRPr lang="en-US"/>
+          </a:p>
+          <a:p>
+            <a:pPr marL="1200150" lvl="2">
+              <a:buChar char="•"/>
+            </a:pPr>
+            <a:endParaRPr lang="en-US"/>
+          </a:p>
+          <a:p>
+            <a:pPr marL="1200150" lvl="2">
+              <a:buChar char="•"/>
+            </a:pPr>
+            <a:endParaRPr lang="en-US"/>
+          </a:p>
+          <a:p>
+            <a:pPr marL="742950" lvl="1">
+              <a:buChar char="•"/>
+            </a:pPr>
+            <a:endParaRPr lang="en-US"/>
           </a:p>
         </p:txBody>
       </p:sp>
       <p:pic>
         <p:nvPicPr>
-          <p:cNvPr id="9" name="Picture 9" descr="A picture containing text&#10;&#10;Description automatically generated">
-            <a:extLst>
-              <a:ext uri="{FF2B5EF4-FFF2-40B4-BE49-F238E27FC236}">
-                <a16:creationId xmlns:a16="http://schemas.microsoft.com/office/drawing/2014/main" id="{FAB8E87F-F546-4A45-A666-A08779B7281C}"/>
+          <p:cNvPr id="15" name="Picture 15">
+            <a:extLst>
+              <a:ext uri="{FF2B5EF4-FFF2-40B4-BE49-F238E27FC236}">
+                <a16:creationId xmlns:a16="http://schemas.microsoft.com/office/drawing/2014/main" id="{30DE5DDE-ADC0-43AD-B5BC-C33B45D417CD}"/>
               </a:ext>
             </a:extLst>
           </p:cNvPr>
@@ -10679,8 +10125,67 @@
         </p:blipFill>
         <p:spPr>
           <a:xfrm>
-            <a:off x="5189035" y="229062"/>
-            <a:ext cx="6413809" cy="5786558"/>
+            <a:off x="245326" y="1951216"/>
+            <a:ext cx="5177883" cy="1859032"/>
+          </a:xfrm>
+          <a:prstGeom prst="rect">
+            <a:avLst/>
+          </a:prstGeom>
+        </p:spPr>
+      </p:pic>
+      <p:pic>
+        <p:nvPicPr>
+          <p:cNvPr id="16" name="Picture 16" descr="Text&#10;&#10;Description automatically generated">
+            <a:extLst>
+              <a:ext uri="{FF2B5EF4-FFF2-40B4-BE49-F238E27FC236}">
+                <a16:creationId xmlns:a16="http://schemas.microsoft.com/office/drawing/2014/main" id="{A8B552C1-96B5-4229-909E-CA09C2357121}"/>
+              </a:ext>
+            </a:extLst>
+          </p:cNvPr>
+          <p:cNvPicPr>
+            <a:picLocks noChangeAspect="1"/>
+          </p:cNvPicPr>
+          <p:nvPr/>
+        </p:nvPicPr>
+        <p:blipFill rotWithShape="1">
+          <a:blip r:embed="rId3"/>
+          <a:srcRect l="4657" t="532" r="3602" b="1389"/>
+          <a:stretch/>
+        </p:blipFill>
+        <p:spPr>
+          <a:xfrm>
+            <a:off x="246744" y="3809753"/>
+            <a:ext cx="5184845" cy="663870"/>
+          </a:xfrm>
+          <a:prstGeom prst="rect">
+            <a:avLst/>
+          </a:prstGeom>
+        </p:spPr>
+      </p:pic>
+      <p:pic>
+        <p:nvPicPr>
+          <p:cNvPr id="17" name="Picture 17">
+            <a:extLst>
+              <a:ext uri="{FF2B5EF4-FFF2-40B4-BE49-F238E27FC236}">
+                <a16:creationId xmlns:a16="http://schemas.microsoft.com/office/drawing/2014/main" id="{C94A4894-8674-4C0C-AAE1-F54B71E3D62A}"/>
+              </a:ext>
+            </a:extLst>
+          </p:cNvPr>
+          <p:cNvPicPr>
+            <a:picLocks noChangeAspect="1"/>
+          </p:cNvPicPr>
+          <p:nvPr/>
+        </p:nvPicPr>
+        <p:blipFill>
+          <a:blip r:embed="rId4"/>
+          <a:stretch>
+            <a:fillRect/>
+          </a:stretch>
+        </p:blipFill>
+        <p:spPr>
+          <a:xfrm>
+            <a:off x="245327" y="4466474"/>
+            <a:ext cx="5177882" cy="1772221"/>
           </a:xfrm>
           <a:prstGeom prst="rect">
             <a:avLst/>
@@ -10690,7 +10195,7 @@
     </p:spTree>
     <p:extLst>
       <p:ext uri="{BB962C8B-B14F-4D97-AF65-F5344CB8AC3E}">
-        <p14:creationId xmlns:p14="http://schemas.microsoft.com/office/powerpoint/2010/main" val="579083461"/>
+        <p14:creationId xmlns:p14="http://schemas.microsoft.com/office/powerpoint/2010/main" val="2416058596"/>
       </p:ext>
     </p:extLst>
   </p:cSld>
@@ -10722,7 +10227,7 @@
           <p:cNvPr id="2" name="Title 1">
             <a:extLst>
               <a:ext uri="{FF2B5EF4-FFF2-40B4-BE49-F238E27FC236}">
-                <a16:creationId xmlns:a16="http://schemas.microsoft.com/office/drawing/2014/main" id="{905B6A71-16F1-44DB-87A7-7857B1656E83}"/>
+                <a16:creationId xmlns:a16="http://schemas.microsoft.com/office/drawing/2014/main" id="{37FD448B-5E1D-4138-A9D0-C1AFBF0851DA}"/>
               </a:ext>
             </a:extLst>
           </p:cNvPr>
@@ -10735,8 +10240,8 @@
         </p:nvSpPr>
         <p:spPr>
           <a:xfrm>
-            <a:off x="210458" y="370695"/>
-            <a:ext cx="4676092" cy="1965379"/>
+            <a:off x="435811" y="225553"/>
+            <a:ext cx="4680868" cy="2079964"/>
           </a:xfrm>
         </p:spPr>
         <p:txBody>
@@ -10746,42 +10251,26 @@
           <a:lstStyle/>
           <a:p>
             <a:r>
-              <a:rPr lang="en-US">
-                <a:ea typeface="+mj-lt"/>
-                <a:cs typeface="+mj-lt"/>
-              </a:rPr>
-              <a:t>After</a:t>
-            </a:r>
-            <a:br>
               <a:rPr lang="en-US">
                 <a:solidFill>
                   <a:schemeClr val="accent1">
                     <a:lumMod val="75000"/>
                   </a:schemeClr>
                 </a:solidFill>
+              </a:rPr>
+              <a:t>Accident</a:t>
+            </a:r>
+            <a:br>
+              <a:rPr lang="en-US"/>
+            </a:br>
+            <a:r>
+              <a:rPr lang="en-US">
                 <a:ea typeface="+mj-lt"/>
                 <a:cs typeface="+mj-lt"/>
               </a:rPr>
-            </a:br>
-            <a:r>
-              <a:rPr lang="en-US">
-                <a:solidFill>
-                  <a:schemeClr val="accent1">
-                    <a:lumMod val="75000"/>
-                  </a:schemeClr>
-                </a:solidFill>
-                <a:ea typeface="+mj-lt"/>
-                <a:cs typeface="+mj-lt"/>
-              </a:rPr>
-              <a:t>DATA CLEANUP </a:t>
-            </a:r>
-            <a:endParaRPr lang="en-US">
-              <a:solidFill>
-                <a:schemeClr val="accent1">
-                  <a:lumMod val="75000"/>
-                </a:schemeClr>
-              </a:solidFill>
-            </a:endParaRPr>
+              <a:t>DATA CLEANUP &amp; EXPLORATION</a:t>
+            </a:r>
+            <a:endParaRPr lang="en-US"/>
           </a:p>
         </p:txBody>
       </p:sp>
@@ -10790,7 +10279,7 @@
           <p:cNvPr id="4" name="Text Placeholder 3">
             <a:extLst>
               <a:ext uri="{FF2B5EF4-FFF2-40B4-BE49-F238E27FC236}">
-                <a16:creationId xmlns:a16="http://schemas.microsoft.com/office/drawing/2014/main" id="{6AAFBA3A-BFA8-4D00-9FBF-DC1BAF7247D7}"/>
+                <a16:creationId xmlns:a16="http://schemas.microsoft.com/office/drawing/2014/main" id="{4FA50C27-35FE-4534-B806-28A9AC89F3FF}"/>
               </a:ext>
             </a:extLst>
           </p:cNvPr>
@@ -10803,8 +10292,8 @@
         </p:nvSpPr>
         <p:spPr>
           <a:xfrm>
-            <a:off x="5335814" y="330001"/>
-            <a:ext cx="6381522" cy="5838344"/>
+            <a:off x="342232" y="2672339"/>
+            <a:ext cx="5322552" cy="3343702"/>
           </a:xfrm>
         </p:spPr>
         <p:txBody>
@@ -10812,149 +10301,94 @@
             <a:normAutofit/>
           </a:bodyPr>
           <a:lstStyle/>
-          <a:p>
-            <a:pPr marL="285750" indent="-285750">
-              <a:buFont typeface="Wingdings,Sans-Serif" panose="020B0604020202020204" pitchFamily="34" charset="0"/>
-              <a:buChar char="Ø"/>
-            </a:pPr>
-            <a:r>
-              <a:rPr lang="en-US">
-                <a:ea typeface="+mn-lt"/>
-                <a:cs typeface="+mn-lt"/>
-              </a:rPr>
-              <a:t>Cleaning the insurance agency data:</a:t>
-            </a:r>
-          </a:p>
-          <a:p>
-            <a:pPr marL="742950" lvl="1" indent="-285750">
-              <a:buFont typeface="Wingdings,Sans-Serif" panose="020B0604020202020204" pitchFamily="34" charset="0"/>
-              <a:buChar char="Ø"/>
-            </a:pPr>
-            <a:r>
-              <a:rPr lang="en-US">
-                <a:ea typeface="+mn-lt"/>
-                <a:cs typeface="+mn-lt"/>
-              </a:rPr>
-              <a:t>We started with 30,545 rows after using the Places API search.</a:t>
-            </a:r>
-          </a:p>
-          <a:p>
-            <a:pPr marL="742950" lvl="1" indent="-285750">
-              <a:buFont typeface="Wingdings,Sans-Serif" panose="020B0604020202020204" pitchFamily="34" charset="0"/>
-              <a:buChar char="Ø"/>
-            </a:pPr>
-            <a:r>
-              <a:rPr lang="en-US">
-                <a:ea typeface="+mn-lt"/>
-                <a:cs typeface="+mn-lt"/>
-              </a:rPr>
-              <a:t>After dropping duplicates, we ended up with 1,831 rows of data.</a:t>
-            </a:r>
-          </a:p>
-          <a:p>
-            <a:pPr marL="742950" lvl="1" indent="-285750">
-              <a:buFont typeface="Wingdings,Sans-Serif" panose="020B0604020202020204" pitchFamily="34" charset="0"/>
-              <a:buChar char="Ø"/>
-            </a:pPr>
-            <a:r>
-              <a:rPr lang="en-US">
-                <a:ea typeface="+mn-lt"/>
-                <a:cs typeface="+mn-lt"/>
-              </a:rPr>
-              <a:t>After dropping all insurance agencies out of state, we ended up with 1,604 rows.</a:t>
-            </a:r>
-          </a:p>
-          <a:p>
-            <a:pPr marL="742950" lvl="1" indent="-285750">
-              <a:buFont typeface="Wingdings,Sans-Serif" panose="020B0604020202020204" pitchFamily="34" charset="0"/>
-              <a:buChar char="Ø"/>
-            </a:pPr>
-            <a:r>
-              <a:rPr lang="en-US">
-                <a:ea typeface="+mn-lt"/>
-                <a:cs typeface="+mn-lt"/>
-              </a:rPr>
-              <a:t>After dropping non-auto insurance agencies, we finally ended up with 1,510 rows.</a:t>
-            </a:r>
-            <a:endParaRPr lang="en-US"/>
-          </a:p>
-          <a:p>
-            <a:pPr marL="742950" lvl="1" indent="-285750">
-              <a:buFont typeface="Wingdings,Sans-Serif" panose="020B0604020202020204" pitchFamily="34" charset="0"/>
-              <a:buChar char="Ø"/>
-            </a:pPr>
-            <a:endParaRPr lang="en-US"/>
-          </a:p>
-          <a:p>
-            <a:pPr marL="742950" lvl="1" indent="-285750">
-              <a:buFont typeface="Wingdings,Sans-Serif" panose="020B0604020202020204" pitchFamily="34" charset="0"/>
-              <a:buChar char="Ø"/>
-            </a:pPr>
-            <a:endParaRPr lang="en-US"/>
-          </a:p>
-          <a:p>
-            <a:pPr marL="742950" lvl="1" indent="-285750">
-              <a:buFont typeface="Wingdings,Sans-Serif" panose="020B0604020202020204" pitchFamily="34" charset="0"/>
-              <a:buChar char="Ø"/>
-            </a:pPr>
-            <a:endParaRPr lang="en-US"/>
-          </a:p>
           <a:p>
             <a:pPr marL="285750" indent="-285750">
               <a:buFont typeface="Wingdings" panose="020B0604020202020204" pitchFamily="34" charset="0"/>
               <a:buChar char="Ø"/>
             </a:pPr>
             <a:r>
-              <a:rPr lang="en-US"/>
-              <a:t>Cleaning the accident data:</a:t>
+              <a:rPr lang="en-US" b="1"/>
+              <a:t>Multiple County Iterations</a:t>
             </a:r>
           </a:p>
           <a:p>
             <a:pPr marL="742950" lvl="1" indent="-285750">
+              <a:buFont typeface="Wingdings" panose="020B0604020202020204" pitchFamily="34" charset="0"/>
+              <a:buChar char="§"/>
+            </a:pPr>
+            <a:r>
+              <a:rPr lang="en-US"/>
+              <a:t>Macon vs Macon-Bibb</a:t>
+            </a:r>
+          </a:p>
+          <a:p>
+            <a:pPr marL="285750" indent="-171450">
               <a:buFont typeface="Wingdings" panose="020B0604020202020204" pitchFamily="34" charset="0"/>
               <a:buChar char="Ø"/>
             </a:pPr>
             <a:r>
-              <a:rPr lang="en-US"/>
-              <a:t>We started with 4.2 million rows of data using the Kaggle US Accidents API.</a:t>
+              <a:rPr lang="en-US" b="1"/>
+              <a:t>County Spelling</a:t>
             </a:r>
           </a:p>
           <a:p>
             <a:pPr marL="742950" lvl="1" indent="-285750">
               <a:buFont typeface="Wingdings" panose="020B0604020202020204" pitchFamily="34" charset="0"/>
-              <a:buChar char="Ø"/>
+              <a:buChar char="§"/>
             </a:pPr>
             <a:r>
               <a:rPr lang="en-US"/>
-              <a:t>After narrowing down to data only in Georgia, we ended up with 93,874 rows of data.</a:t>
-            </a:r>
-          </a:p>
-          <a:p>
-            <a:pPr lvl="1"/>
-            <a:endParaRPr lang="en-US"/>
-          </a:p>
-          <a:p>
-            <a:pPr marL="742950" lvl="1" indent="-285750">
+              <a:t>County names were showing different case distinctions</a:t>
+            </a:r>
+          </a:p>
+          <a:p>
+            <a:pPr marL="1371600" lvl="2" indent="-171450">
+              <a:buFont typeface="Courier New" panose="020B0604020202020204" pitchFamily="34" charset="0"/>
+              <a:buChar char="o"/>
+            </a:pPr>
+            <a:r>
+              <a:rPr lang="en-US"/>
+              <a:t>DeKalb vs Dekalb </a:t>
+            </a:r>
+          </a:p>
+          <a:p>
+            <a:pPr marL="1371600" lvl="2" indent="-171450">
+              <a:buFont typeface="Courier New" panose="020B0604020202020204" pitchFamily="34" charset="0"/>
+              <a:buChar char="o"/>
+            </a:pPr>
+            <a:r>
+              <a:rPr lang="en-US"/>
+              <a:t>McDuffie vs Mcduffie  </a:t>
+            </a:r>
+          </a:p>
+          <a:p>
+            <a:pPr marL="1371600" lvl="2" indent="-171450">
+              <a:buFont typeface="Courier New" panose="020B0604020202020204" pitchFamily="34" charset="0"/>
+              <a:buChar char="o"/>
+            </a:pPr>
+            <a:r>
+              <a:rPr lang="en-US"/>
+              <a:t>McIntosh vs Mcintosh </a:t>
+            </a:r>
+          </a:p>
+          <a:p>
+            <a:pPr marL="914400" lvl="1" indent="-285750">
               <a:buFont typeface="Wingdings" panose="020B0604020202020204" pitchFamily="34" charset="0"/>
-              <a:buChar char="Ø"/>
+              <a:buChar char="v"/>
             </a:pPr>
-            <a:endParaRPr lang="en-US"/>
-          </a:p>
-          <a:p>
-            <a:pPr marL="742950" lvl="1" indent="-285750">
-              <a:buFont typeface="Wingdings" panose="020B0604020202020204" pitchFamily="34" charset="0"/>
-              <a:buChar char="Ø"/>
-            </a:pPr>
-            <a:endParaRPr lang="en-US"/>
+            <a:r>
+              <a:rPr lang="en-US" b="1"/>
+              <a:t>Resulting in county count being incorrect (163 vs 159)</a:t>
+            </a:r>
           </a:p>
         </p:txBody>
       </p:sp>
       <p:pic>
         <p:nvPicPr>
-          <p:cNvPr id="3" name="Picture 4" descr="A picture containing text&#10;&#10;Description automatically generated">
-            <a:extLst>
-              <a:ext uri="{FF2B5EF4-FFF2-40B4-BE49-F238E27FC236}">
-                <a16:creationId xmlns:a16="http://schemas.microsoft.com/office/drawing/2014/main" id="{F5785DB3-A3C8-4F8D-8289-329EACA33B4D}"/>
+          <p:cNvPr id="9" name="Picture 9" descr="A picture containing text&#10;&#10;Description automatically generated">
+            <a:extLst>
+              <a:ext uri="{FF2B5EF4-FFF2-40B4-BE49-F238E27FC236}">
+                <a16:creationId xmlns:a16="http://schemas.microsoft.com/office/drawing/2014/main" id="{FAB8E87F-F546-4A45-A666-A08779B7281C}"/>
               </a:ext>
             </a:extLst>
           </p:cNvPr>
@@ -10971,8 +10405,8 @@
         </p:blipFill>
         <p:spPr>
           <a:xfrm>
-            <a:off x="208156" y="2515514"/>
-            <a:ext cx="4666785" cy="3100068"/>
+            <a:off x="5189035" y="229062"/>
+            <a:ext cx="6413809" cy="5786558"/>
           </a:xfrm>
           <a:prstGeom prst="rect">
             <a:avLst/>
@@ -10982,7 +10416,7 @@
     </p:spTree>
     <p:extLst>
       <p:ext uri="{BB962C8B-B14F-4D97-AF65-F5344CB8AC3E}">
-        <p14:creationId xmlns:p14="http://schemas.microsoft.com/office/powerpoint/2010/main" val="1367968221"/>
+        <p14:creationId xmlns:p14="http://schemas.microsoft.com/office/powerpoint/2010/main" val="579083461"/>
       </p:ext>
     </p:extLst>
   </p:cSld>
@@ -11014,7 +10448,7 @@
           <p:cNvPr id="2" name="Title 1">
             <a:extLst>
               <a:ext uri="{FF2B5EF4-FFF2-40B4-BE49-F238E27FC236}">
-                <a16:creationId xmlns:a16="http://schemas.microsoft.com/office/drawing/2014/main" id="{4E0B393A-C63C-4D72-BD59-CD3850EF9070}"/>
+                <a16:creationId xmlns:a16="http://schemas.microsoft.com/office/drawing/2014/main" id="{905B6A71-16F1-44DB-87A7-7857B1656E83}"/>
               </a:ext>
             </a:extLst>
           </p:cNvPr>
@@ -11027,27 +10461,62 @@
         </p:nvSpPr>
         <p:spPr>
           <a:xfrm>
-            <a:off x="1324271" y="596745"/>
-            <a:ext cx="10241280" cy="699621"/>
-          </a:xfrm>
-        </p:spPr>
-        <p:txBody>
-          <a:bodyPr/>
-          <a:lstStyle/>
-          <a:p>
-            <a:r>
-              <a:rPr lang="en-US"/>
-              <a:t>Statistical methods</a:t>
-            </a:r>
-          </a:p>
-        </p:txBody>
-      </p:sp>
-      <p:sp>
-        <p:nvSpPr>
-          <p:cNvPr id="3" name="Content Placeholder 2">
-            <a:extLst>
-              <a:ext uri="{FF2B5EF4-FFF2-40B4-BE49-F238E27FC236}">
-                <a16:creationId xmlns:a16="http://schemas.microsoft.com/office/drawing/2014/main" id="{F558F677-D8A2-430F-B9A1-9863EB3035C2}"/>
+            <a:off x="210458" y="370695"/>
+            <a:ext cx="4676092" cy="1965379"/>
+          </a:xfrm>
+        </p:spPr>
+        <p:txBody>
+          <a:bodyPr>
+            <a:normAutofit/>
+          </a:bodyPr>
+          <a:lstStyle/>
+          <a:p>
+            <a:r>
+              <a:rPr lang="en-US">
+                <a:ea typeface="+mj-lt"/>
+                <a:cs typeface="+mj-lt"/>
+              </a:rPr>
+              <a:t>After</a:t>
+            </a:r>
+            <a:br>
+              <a:rPr lang="en-US">
+                <a:solidFill>
+                  <a:schemeClr val="accent1">
+                    <a:lumMod val="75000"/>
+                  </a:schemeClr>
+                </a:solidFill>
+                <a:ea typeface="+mj-lt"/>
+                <a:cs typeface="+mj-lt"/>
+              </a:rPr>
+            </a:br>
+            <a:r>
+              <a:rPr lang="en-US">
+                <a:solidFill>
+                  <a:schemeClr val="accent1">
+                    <a:lumMod val="75000"/>
+                  </a:schemeClr>
+                </a:solidFill>
+                <a:ea typeface="+mj-lt"/>
+                <a:cs typeface="+mj-lt"/>
+              </a:rPr>
+              <a:t>DATA CLEANUP </a:t>
+            </a:r>
+            <a:endParaRPr lang="en-US">
+              <a:solidFill>
+                <a:schemeClr val="accent1">
+                  <a:lumMod val="75000"/>
+                </a:schemeClr>
+              </a:solidFill>
+            </a:endParaRPr>
+          </a:p>
+        </p:txBody>
+      </p:sp>
+      <p:sp>
+        <p:nvSpPr>
+          <p:cNvPr id="4" name="Text Placeholder 3">
+            <a:extLst>
+              <a:ext uri="{FF2B5EF4-FFF2-40B4-BE49-F238E27FC236}">
+                <a16:creationId xmlns:a16="http://schemas.microsoft.com/office/drawing/2014/main" id="{6AAFBA3A-BFA8-4D00-9FBF-DC1BAF7247D7}"/>
               </a:ext>
             </a:extLst>
           </p:cNvPr>
@@ -11055,13 +10524,13 @@
             <a:spLocks noGrp="1"/>
           </p:cNvSpPr>
           <p:nvPr>
-            <p:ph idx="1"/>
+            <p:ph type="body" sz="half" idx="2"/>
           </p:nvPr>
         </p:nvSpPr>
         <p:spPr>
           <a:xfrm>
-            <a:off x="1324271" y="1714699"/>
-            <a:ext cx="10241280" cy="3959352"/>
+            <a:off x="5335814" y="330001"/>
+            <a:ext cx="6381522" cy="5838344"/>
           </a:xfrm>
         </p:spPr>
         <p:txBody>
@@ -11070,75 +10539,146 @@
           </a:bodyPr>
           <a:lstStyle/>
           <a:p>
-            <a:r>
-              <a:rPr lang="en-US"/>
-              <a:t>Hot-spot Analysis.</a:t>
+            <a:pPr marL="285750" indent="-285750">
+              <a:buFont typeface="Wingdings,Sans-Serif" panose="020B0604020202020204" pitchFamily="34" charset="0"/>
+              <a:buChar char="Ø"/>
+            </a:pPr>
+            <a:r>
+              <a:rPr lang="en-US">
+                <a:ea typeface="+mn-lt"/>
+                <a:cs typeface="+mn-lt"/>
+              </a:rPr>
+              <a:t>Cleaning the insurance agency data:</a:t>
+            </a:r>
+          </a:p>
+          <a:p>
+            <a:pPr marL="742950" lvl="1" indent="-285750">
+              <a:buFont typeface="Wingdings,Sans-Serif" panose="020B0604020202020204" pitchFamily="34" charset="0"/>
+              <a:buChar char="Ø"/>
+            </a:pPr>
+            <a:r>
+              <a:rPr lang="en-US">
+                <a:ea typeface="+mn-lt"/>
+                <a:cs typeface="+mn-lt"/>
+              </a:rPr>
+              <a:t>We started with 30,545 rows after using the Places API search.</a:t>
+            </a:r>
+          </a:p>
+          <a:p>
+            <a:pPr marL="742950" lvl="1" indent="-285750">
+              <a:buFont typeface="Wingdings,Sans-Serif" panose="020B0604020202020204" pitchFamily="34" charset="0"/>
+              <a:buChar char="Ø"/>
+            </a:pPr>
+            <a:r>
+              <a:rPr lang="en-US">
+                <a:ea typeface="+mn-lt"/>
+                <a:cs typeface="+mn-lt"/>
+              </a:rPr>
+              <a:t>After dropping duplicates, we ended up with 1,831 rows of data.</a:t>
+            </a:r>
+          </a:p>
+          <a:p>
+            <a:pPr marL="742950" lvl="1" indent="-285750">
+              <a:buFont typeface="Wingdings,Sans-Serif" panose="020B0604020202020204" pitchFamily="34" charset="0"/>
+              <a:buChar char="Ø"/>
+            </a:pPr>
+            <a:r>
+              <a:rPr lang="en-US">
+                <a:ea typeface="+mn-lt"/>
+                <a:cs typeface="+mn-lt"/>
+              </a:rPr>
+              <a:t>After dropping all insurance agencies out of state, we ended up with 1,604 rows.</a:t>
+            </a:r>
+          </a:p>
+          <a:p>
+            <a:pPr marL="742950" lvl="1" indent="-285750">
+              <a:buFont typeface="Wingdings,Sans-Serif" panose="020B0604020202020204" pitchFamily="34" charset="0"/>
+              <a:buChar char="Ø"/>
+            </a:pPr>
+            <a:r>
+              <a:rPr lang="en-US">
+                <a:ea typeface="+mn-lt"/>
+                <a:cs typeface="+mn-lt"/>
+              </a:rPr>
+              <a:t>After dropping non-auto insurance agencies, we finally ended up with 1,510 rows.</a:t>
+            </a:r>
+            <a:endParaRPr lang="en-US"/>
+          </a:p>
+          <a:p>
+            <a:pPr marL="742950" lvl="1" indent="-285750">
+              <a:buFont typeface="Wingdings,Sans-Serif" panose="020B0604020202020204" pitchFamily="34" charset="0"/>
+              <a:buChar char="Ø"/>
+            </a:pPr>
+            <a:endParaRPr lang="en-US"/>
+          </a:p>
+          <a:p>
+            <a:pPr marL="742950" lvl="1" indent="-285750">
+              <a:buFont typeface="Wingdings,Sans-Serif" panose="020B0604020202020204" pitchFamily="34" charset="0"/>
+              <a:buChar char="Ø"/>
+            </a:pPr>
+            <a:endParaRPr lang="en-US"/>
+          </a:p>
+          <a:p>
+            <a:pPr marL="742950" lvl="1" indent="-285750">
+              <a:buFont typeface="Wingdings,Sans-Serif" panose="020B0604020202020204" pitchFamily="34" charset="0"/>
+              <a:buChar char="Ø"/>
+            </a:pPr>
+            <a:endParaRPr lang="en-US"/>
+          </a:p>
+          <a:p>
+            <a:pPr marL="285750" indent="-285750">
+              <a:buFont typeface="Wingdings" panose="020B0604020202020204" pitchFamily="34" charset="0"/>
+              <a:buChar char="Ø"/>
+            </a:pPr>
+            <a:r>
+              <a:rPr lang="en-US"/>
+              <a:t>Cleaning the accident data:</a:t>
+            </a:r>
+          </a:p>
+          <a:p>
+            <a:pPr marL="742950" lvl="1" indent="-285750">
+              <a:buFont typeface="Wingdings" panose="020B0604020202020204" pitchFamily="34" charset="0"/>
+              <a:buChar char="Ø"/>
+            </a:pPr>
+            <a:r>
+              <a:rPr lang="en-US"/>
+              <a:t>We started with 4.2 million rows of data using the Kaggle US Accidents API.</a:t>
+            </a:r>
+          </a:p>
+          <a:p>
+            <a:pPr marL="742950" lvl="1" indent="-285750">
+              <a:buFont typeface="Wingdings" panose="020B0604020202020204" pitchFamily="34" charset="0"/>
+              <a:buChar char="Ø"/>
+            </a:pPr>
+            <a:r>
+              <a:rPr lang="en-US"/>
+              <a:t>After narrowing down to data only in Georgia, we ended up with 93,874 rows of data.</a:t>
             </a:r>
           </a:p>
           <a:p>
             <a:pPr lvl="1"/>
-            <a:r>
-              <a:rPr lang="en-US" err="1"/>
-              <a:t>Getis</a:t>
-            </a:r>
-            <a:r>
-              <a:rPr lang="en-US"/>
-              <a:t>-Ord G statistics.</a:t>
-            </a:r>
-          </a:p>
-          <a:p>
-            <a:pPr lvl="2"/>
-            <a:r>
-              <a:rPr lang="en-US"/>
-              <a:t>Measures the proportional sum of counts around a location (relative to the total sum).</a:t>
-            </a:r>
-          </a:p>
-          <a:p>
-            <a:pPr lvl="2"/>
-            <a:r>
-              <a:rPr lang="en-US"/>
-              <a:t>Identify counties where the sum of counts around that spot makes up a high or low proportion of the total sum.</a:t>
-            </a:r>
-          </a:p>
-          <a:p>
-            <a:pPr lvl="2"/>
-            <a:r>
-              <a:rPr lang="en-US"/>
-              <a:t>Used G* (G-star): the focal county is included in the sum.</a:t>
-            </a:r>
-          </a:p>
-          <a:p>
-            <a:pPr lvl="2"/>
-            <a:r>
-              <a:rPr lang="en-US"/>
-              <a:t>All counties touching a county included.</a:t>
-            </a:r>
-          </a:p>
-          <a:p>
-            <a:pPr marL="685800"/>
             <a:endParaRPr lang="en-US"/>
           </a:p>
           <a:p>
-            <a:endParaRPr lang="en-US">
-              <a:ea typeface="+mn-lt"/>
-              <a:cs typeface="+mn-lt"/>
-            </a:endParaRPr>
-          </a:p>
-          <a:p>
-            <a:pPr marL="0" indent="0">
-              <a:buNone/>
+            <a:pPr marL="742950" lvl="1" indent="-285750">
+              <a:buFont typeface="Wingdings" panose="020B0604020202020204" pitchFamily="34" charset="0"/>
+              <a:buChar char="Ø"/>
             </a:pPr>
-            <a:endParaRPr lang="en-US">
-              <a:ea typeface="+mn-lt"/>
-              <a:cs typeface="+mn-lt"/>
-            </a:endParaRPr>
+            <a:endParaRPr lang="en-US"/>
+          </a:p>
+          <a:p>
+            <a:pPr marL="742950" lvl="1" indent="-285750">
+              <a:buFont typeface="Wingdings" panose="020B0604020202020204" pitchFamily="34" charset="0"/>
+              <a:buChar char="Ø"/>
+            </a:pPr>
+            <a:endParaRPr lang="en-US"/>
           </a:p>
         </p:txBody>
       </p:sp>
     </p:spTree>
     <p:extLst>
       <p:ext uri="{BB962C8B-B14F-4D97-AF65-F5344CB8AC3E}">
-        <p14:creationId xmlns:p14="http://schemas.microsoft.com/office/powerpoint/2010/main" val="3230870203"/>
+        <p14:creationId xmlns:p14="http://schemas.microsoft.com/office/powerpoint/2010/main" val="1367968221"/>
       </p:ext>
     </p:extLst>
   </p:cSld>
@@ -11170,7 +10710,7 @@
           <p:cNvPr id="2" name="Title 1">
             <a:extLst>
               <a:ext uri="{FF2B5EF4-FFF2-40B4-BE49-F238E27FC236}">
-                <a16:creationId xmlns:a16="http://schemas.microsoft.com/office/drawing/2014/main" id="{A58A2383-D90F-418D-8ED9-33C005B2248F}"/>
+                <a16:creationId xmlns:a16="http://schemas.microsoft.com/office/drawing/2014/main" id="{4E0B393A-C63C-4D72-BD59-CD3850EF9070}"/>
               </a:ext>
             </a:extLst>
           </p:cNvPr>
@@ -11183,20 +10723,17 @@
         </p:nvSpPr>
         <p:spPr>
           <a:xfrm>
-            <a:off x="1045029" y="2153876"/>
-            <a:ext cx="10241280" cy="1234440"/>
-          </a:xfrm>
-        </p:spPr>
-        <p:txBody>
-          <a:bodyPr>
-            <a:normAutofit/>
-          </a:bodyPr>
-          <a:lstStyle/>
-          <a:p>
-            <a:pPr algn="ctr"/>
-            <a:r>
-              <a:rPr lang="en-US" sz="6600"/>
-              <a:t>RESULTS</a:t>
+            <a:off x="1324271" y="596745"/>
+            <a:ext cx="10241280" cy="699621"/>
+          </a:xfrm>
+        </p:spPr>
+        <p:txBody>
+          <a:bodyPr/>
+          <a:lstStyle/>
+          <a:p>
+            <a:r>
+              <a:rPr lang="en-US"/>
+              <a:t>Statistical methods</a:t>
             </a:r>
           </a:p>
         </p:txBody>
@@ -11206,7 +10743,7 @@
           <p:cNvPr id="3" name="Content Placeholder 2">
             <a:extLst>
               <a:ext uri="{FF2B5EF4-FFF2-40B4-BE49-F238E27FC236}">
-                <a16:creationId xmlns:a16="http://schemas.microsoft.com/office/drawing/2014/main" id="{6AA7DEB6-6037-4947-832C-F98B38359A15}"/>
+                <a16:creationId xmlns:a16="http://schemas.microsoft.com/office/drawing/2014/main" id="{F558F677-D8A2-430F-B9A1-9863EB3035C2}"/>
               </a:ext>
             </a:extLst>
           </p:cNvPr>
@@ -11217,11 +10754,98 @@
             <p:ph idx="1"/>
           </p:nvPr>
         </p:nvSpPr>
-        <p:spPr/>
-        <p:txBody>
-          <a:bodyPr/>
-          <a:lstStyle/>
-          <a:p>
+        <p:spPr>
+          <a:xfrm>
+            <a:off x="1324271" y="1714699"/>
+            <a:ext cx="10241280" cy="3959352"/>
+          </a:xfrm>
+        </p:spPr>
+        <p:txBody>
+          <a:bodyPr vert="horz" lIns="0" tIns="0" rIns="0" bIns="0" rtlCol="0" anchor="t">
+            <a:normAutofit lnSpcReduction="10000"/>
+          </a:bodyPr>
+          <a:lstStyle/>
+          <a:p>
+            <a:r>
+              <a:rPr lang="en-US"/>
+              <a:t>Hot-spot Analysis.</a:t>
+            </a:r>
+          </a:p>
+          <a:p>
+            <a:pPr lvl="1"/>
+            <a:r>
+              <a:rPr lang="en-US" err="1"/>
+              <a:t>Getis</a:t>
+            </a:r>
+            <a:r>
+              <a:rPr lang="en-US"/>
+              <a:t>-Ord G statistics.</a:t>
+            </a:r>
+          </a:p>
+          <a:p>
+            <a:pPr lvl="2"/>
+            <a:r>
+              <a:rPr lang="en-US"/>
+              <a:t>Measures the proportional sum of counts around a location (relative to the total sum).</a:t>
+            </a:r>
+          </a:p>
+          <a:p>
+            <a:pPr lvl="2"/>
+            <a:r>
+              <a:rPr lang="en-US"/>
+              <a:t>Identify counties where the sum of counts around that spot makes up a high or low proportion of the total sum.</a:t>
+            </a:r>
+          </a:p>
+          <a:p>
+            <a:pPr lvl="2"/>
+            <a:r>
+              <a:rPr lang="en-US"/>
+              <a:t>Used G* (G-star): the focal county is included in the sum.</a:t>
+            </a:r>
+          </a:p>
+          <a:p>
+            <a:pPr lvl="2"/>
+            <a:r>
+              <a:rPr lang="en-US"/>
+              <a:t>All counties touching a county included.</a:t>
+            </a:r>
+          </a:p>
+          <a:p>
+            <a:endParaRPr lang="en-US"/>
+          </a:p>
+          <a:p>
+            <a:r>
+              <a:rPr lang="en-US">
+                <a:ea typeface="+mn-lt"/>
+                <a:cs typeface="+mn-lt"/>
+              </a:rPr>
+              <a:t>Generalized Linear Model: Poisson Regression? Quasi-Poisson Reqresssion?</a:t>
+            </a:r>
+          </a:p>
+          <a:p>
+            <a:pPr lvl="1"/>
+            <a:r>
+              <a:rPr lang="en-US">
+                <a:ea typeface="+mn-lt"/>
+                <a:cs typeface="+mn-lt"/>
+              </a:rPr>
+              <a:t>Suitable for counts or rates of events.</a:t>
+            </a:r>
+          </a:p>
+          <a:p>
+            <a:pPr marL="685800"/>
+            <a:endParaRPr lang="en-US">
+              <a:ea typeface="+mn-lt"/>
+              <a:cs typeface="+mn-lt"/>
+            </a:endParaRPr>
+          </a:p>
+          <a:p>
+            <a:endParaRPr lang="en-US"/>
+          </a:p>
+          <a:p>
+            <a:pPr marL="0" indent="0">
+              <a:buNone/>
+            </a:pPr>
             <a:endParaRPr lang="en-US"/>
           </a:p>
         </p:txBody>
@@ -11229,7 +10853,7 @@
     </p:spTree>
     <p:extLst>
       <p:ext uri="{BB962C8B-B14F-4D97-AF65-F5344CB8AC3E}">
-        <p14:creationId xmlns:p14="http://schemas.microsoft.com/office/powerpoint/2010/main" val="109206503"/>
+        <p14:creationId xmlns:p14="http://schemas.microsoft.com/office/powerpoint/2010/main" val="3230870203"/>
       </p:ext>
     </p:extLst>
   </p:cSld>

</xml_diff>